<commit_message>
slides operations and lists
</commit_message>
<xml_diff>
--- a/ipsa/slides/lists.pptx
+++ b/ipsa/slides/lists.pptx
@@ -143,8 +143,99 @@
 </p:presentation>
 </file>
 
+<file path=ppt/revisionInfo.xml><?xml version="1.0" encoding="utf-8"?>
+<p1510:revInfo xmlns:a="http://schemas.openxmlformats.org/drawingml/2006/main" xmlns:r="http://schemas.openxmlformats.org/officeDocument/2006/relationships" xmlns:p1510="http://schemas.microsoft.com/office/powerpoint/2015/10/main">
+  <p1510:revLst>
+    <p1510:client id="{DB78D39E-575E-45E5-B6C0-876F5A9D7068}" v="4" dt="2023-02-08T10:56:14.972"/>
+  </p1510:revLst>
+</p1510:revInfo>
+</file>
+
 <file path=ppt/changesInfos/changesInfo1.xml><?xml version="1.0" encoding="utf-8"?>
 <pc:chgInfo xmlns:a="http://schemas.openxmlformats.org/drawingml/2006/main" xmlns:r="http://schemas.openxmlformats.org/officeDocument/2006/relationships" xmlns:ac="http://schemas.microsoft.com/office/drawing/2013/main/command" xmlns:pc="http://schemas.microsoft.com/office/powerpoint/2013/main/command">
+  <pc:docChgLst>
+    <pc:chgData name="Gerth Stølting Brodal" userId="04ef4784-6591-4f86-a140-f5c3b108582a" providerId="ADAL" clId="{DB78D39E-575E-45E5-B6C0-876F5A9D7068}"/>
+    <pc:docChg chg="undo redo custSel modSld">
+      <pc:chgData name="Gerth Stølting Brodal" userId="04ef4784-6591-4f86-a140-f5c3b108582a" providerId="ADAL" clId="{DB78D39E-575E-45E5-B6C0-876F5A9D7068}" dt="2023-02-08T11:31:38.112" v="321" actId="20577"/>
+      <pc:docMkLst>
+        <pc:docMk/>
+      </pc:docMkLst>
+      <pc:sldChg chg="modNotesTx">
+        <pc:chgData name="Gerth Stølting Brodal" userId="04ef4784-6591-4f86-a140-f5c3b108582a" providerId="ADAL" clId="{DB78D39E-575E-45E5-B6C0-876F5A9D7068}" dt="2023-02-08T11:16:08.551" v="265" actId="20577"/>
+        <pc:sldMkLst>
+          <pc:docMk/>
+          <pc:sldMk cId="597623407" sldId="459"/>
+        </pc:sldMkLst>
+      </pc:sldChg>
+      <pc:sldChg chg="modSp mod">
+        <pc:chgData name="Gerth Stølting Brodal" userId="04ef4784-6591-4f86-a140-f5c3b108582a" providerId="ADAL" clId="{DB78D39E-575E-45E5-B6C0-876F5A9D7068}" dt="2023-02-08T10:43:16.881" v="103" actId="20577"/>
+        <pc:sldMkLst>
+          <pc:docMk/>
+          <pc:sldMk cId="1841815763" sldId="485"/>
+        </pc:sldMkLst>
+        <pc:spChg chg="mod">
+          <ac:chgData name="Gerth Stølting Brodal" userId="04ef4784-6591-4f86-a140-f5c3b108582a" providerId="ADAL" clId="{DB78D39E-575E-45E5-B6C0-876F5A9D7068}" dt="2023-02-08T10:43:16.881" v="103" actId="20577"/>
+          <ac:spMkLst>
+            <pc:docMk/>
+            <pc:sldMk cId="1841815763" sldId="485"/>
+            <ac:spMk id="3" creationId="{00000000-0000-0000-0000-000000000000}"/>
+          </ac:spMkLst>
+        </pc:spChg>
+      </pc:sldChg>
+      <pc:sldChg chg="modSp mod">
+        <pc:chgData name="Gerth Stølting Brodal" userId="04ef4784-6591-4f86-a140-f5c3b108582a" providerId="ADAL" clId="{DB78D39E-575E-45E5-B6C0-876F5A9D7068}" dt="2023-02-08T08:47:52.638" v="10" actId="20577"/>
+        <pc:sldMkLst>
+          <pc:docMk/>
+          <pc:sldMk cId="3580155105" sldId="487"/>
+        </pc:sldMkLst>
+        <pc:spChg chg="mod">
+          <ac:chgData name="Gerth Stølting Brodal" userId="04ef4784-6591-4f86-a140-f5c3b108582a" providerId="ADAL" clId="{DB78D39E-575E-45E5-B6C0-876F5A9D7068}" dt="2023-02-08T08:47:52.638" v="10" actId="20577"/>
+          <ac:spMkLst>
+            <pc:docMk/>
+            <pc:sldMk cId="3580155105" sldId="487"/>
+            <ac:spMk id="3" creationId="{00000000-0000-0000-0000-000000000000}"/>
+          </ac:spMkLst>
+        </pc:spChg>
+      </pc:sldChg>
+      <pc:sldChg chg="addSp modSp mod modAnim modNotesTx">
+        <pc:chgData name="Gerth Stølting Brodal" userId="04ef4784-6591-4f86-a140-f5c3b108582a" providerId="ADAL" clId="{DB78D39E-575E-45E5-B6C0-876F5A9D7068}" dt="2023-02-08T10:57:01.602" v="208" actId="20577"/>
+        <pc:sldMkLst>
+          <pc:docMk/>
+          <pc:sldMk cId="2231878254" sldId="505"/>
+        </pc:sldMkLst>
+        <pc:spChg chg="add mod">
+          <ac:chgData name="Gerth Stølting Brodal" userId="04ef4784-6591-4f86-a140-f5c3b108582a" providerId="ADAL" clId="{DB78D39E-575E-45E5-B6C0-876F5A9D7068}" dt="2023-02-08T10:55:57.028" v="167" actId="14100"/>
+          <ac:spMkLst>
+            <pc:docMk/>
+            <pc:sldMk cId="2231878254" sldId="505"/>
+            <ac:spMk id="5" creationId="{7CADA278-923D-143B-3BB6-1FEE8AB4BB03}"/>
+          </ac:spMkLst>
+        </pc:spChg>
+      </pc:sldChg>
+      <pc:sldChg chg="modNotesTx">
+        <pc:chgData name="Gerth Stølting Brodal" userId="04ef4784-6591-4f86-a140-f5c3b108582a" providerId="ADAL" clId="{DB78D39E-575E-45E5-B6C0-876F5A9D7068}" dt="2023-02-08T11:17:10.610" v="316" actId="20577"/>
+        <pc:sldMkLst>
+          <pc:docMk/>
+          <pc:sldMk cId="144530098" sldId="507"/>
+        </pc:sldMkLst>
+      </pc:sldChg>
+      <pc:sldChg chg="modSp mod">
+        <pc:chgData name="Gerth Stølting Brodal" userId="04ef4784-6591-4f86-a140-f5c3b108582a" providerId="ADAL" clId="{DB78D39E-575E-45E5-B6C0-876F5A9D7068}" dt="2023-02-08T11:31:38.112" v="321" actId="20577"/>
+        <pc:sldMkLst>
+          <pc:docMk/>
+          <pc:sldMk cId="3794473685" sldId="515"/>
+        </pc:sldMkLst>
+        <pc:graphicFrameChg chg="modGraphic">
+          <ac:chgData name="Gerth Stølting Brodal" userId="04ef4784-6591-4f86-a140-f5c3b108582a" providerId="ADAL" clId="{DB78D39E-575E-45E5-B6C0-876F5A9D7068}" dt="2023-02-08T11:31:38.112" v="321" actId="20577"/>
+          <ac:graphicFrameMkLst>
+            <pc:docMk/>
+            <pc:sldMk cId="3794473685" sldId="515"/>
+            <ac:graphicFrameMk id="4" creationId="{00000000-0000-0000-0000-000000000000}"/>
+          </ac:graphicFrameMkLst>
+        </pc:graphicFrameChg>
+      </pc:sldChg>
+    </pc:docChg>
+  </pc:docChgLst>
   <pc:docChgLst>
     <pc:chgData name="Gerth Stølting Brodal" userId="04ef4784-6591-4f86-a140-f5c3b108582a" providerId="ADAL" clId="{DBC7B104-988F-491C-9F36-B33E053AAD93}"/>
     <pc:docChg chg="custSel modSld">
@@ -277,7 +368,7 @@
           <a:p>
             <a:fld id="{FB1A172F-81D4-4DC4-9113-1DBD56EC3646}" type="datetimeFigureOut">
               <a:rPr lang="en-US" smtClean="0"/>
-              <a:t>2/9/2022</a:t>
+              <a:t>2/8/2023</a:t>
             </a:fld>
             <a:endParaRPr lang="en-US"/>
           </a:p>
@@ -1397,7 +1488,10 @@
           <a:bodyPr/>
           <a:lstStyle/>
           <a:p>
-            <a:endParaRPr lang="en-US" dirty="0"/>
+            <a:r>
+              <a:rPr lang="en-US" dirty="0"/>
+              <a:t>Pythontutor.com only uses Python 3.6</a:t>
+            </a:r>
           </a:p>
         </p:txBody>
       </p:sp>
@@ -1692,6 +1786,12 @@
           </a:p>
           <a:p>
             <a:r>
+              <a:rPr lang="en-US" baseline="0" dirty="0"/>
+              <a:t>Needs keyword NEXT to indicate where the FOR loop ends</a:t>
+            </a:r>
+          </a:p>
+          <a:p>
+            <a:r>
               <a:rPr lang="en-US" dirty="0"/>
               <a:t>https://vice.pokefinder.org/ run x64.exe</a:t>
             </a:r>
@@ -1898,6 +1998,16 @@
             <a:r>
               <a:rPr lang="en-US" baseline="0" dirty="0"/>
               <a:t> of tested loops</a:t>
+            </a:r>
+          </a:p>
+          <a:p>
+            <a:r>
+              <a:rPr lang="en-US" baseline="0" dirty="0" err="1"/>
+              <a:t>Handin</a:t>
+            </a:r>
+            <a:r>
+              <a:rPr lang="en-US" baseline="0" dirty="0"/>
+              <a:t>: make a more efficient algorithm</a:t>
             </a:r>
             <a:endParaRPr lang="en-US" dirty="0"/>
           </a:p>
@@ -2076,7 +2186,7 @@
           <a:p>
             <a:fld id="{0560A9CD-0304-4E0B-9E82-E7E0115DE05B}" type="datetimeFigureOut">
               <a:rPr lang="en-US" smtClean="0"/>
-              <a:t>2/9/2022</a:t>
+              <a:t>2/8/2023</a:t>
             </a:fld>
             <a:endParaRPr lang="en-US"/>
           </a:p>
@@ -2244,7 +2354,7 @@
           <a:p>
             <a:fld id="{0560A9CD-0304-4E0B-9E82-E7E0115DE05B}" type="datetimeFigureOut">
               <a:rPr lang="en-US" smtClean="0"/>
-              <a:t>2/9/2022</a:t>
+              <a:t>2/8/2023</a:t>
             </a:fld>
             <a:endParaRPr lang="en-US"/>
           </a:p>
@@ -2422,7 +2532,7 @@
           <a:p>
             <a:fld id="{0560A9CD-0304-4E0B-9E82-E7E0115DE05B}" type="datetimeFigureOut">
               <a:rPr lang="en-US" smtClean="0"/>
-              <a:t>2/9/2022</a:t>
+              <a:t>2/8/2023</a:t>
             </a:fld>
             <a:endParaRPr lang="en-US"/>
           </a:p>
@@ -2599,7 +2709,7 @@
           <a:p>
             <a:fld id="{0560A9CD-0304-4E0B-9E82-E7E0115DE05B}" type="datetimeFigureOut">
               <a:rPr lang="en-US" smtClean="0"/>
-              <a:t>2/9/2022</a:t>
+              <a:t>2/8/2023</a:t>
             </a:fld>
             <a:endParaRPr lang="en-US"/>
           </a:p>
@@ -2844,7 +2954,7 @@
           <a:p>
             <a:fld id="{0560A9CD-0304-4E0B-9E82-E7E0115DE05B}" type="datetimeFigureOut">
               <a:rPr lang="en-US" smtClean="0"/>
-              <a:t>2/9/2022</a:t>
+              <a:t>2/8/2023</a:t>
             </a:fld>
             <a:endParaRPr lang="en-US"/>
           </a:p>
@@ -3073,7 +3183,7 @@
           <a:p>
             <a:fld id="{0560A9CD-0304-4E0B-9E82-E7E0115DE05B}" type="datetimeFigureOut">
               <a:rPr lang="en-US" smtClean="0"/>
-              <a:t>2/9/2022</a:t>
+              <a:t>2/8/2023</a:t>
             </a:fld>
             <a:endParaRPr lang="en-US"/>
           </a:p>
@@ -3437,7 +3547,7 @@
           <a:p>
             <a:fld id="{0560A9CD-0304-4E0B-9E82-E7E0115DE05B}" type="datetimeFigureOut">
               <a:rPr lang="en-US" smtClean="0"/>
-              <a:t>2/9/2022</a:t>
+              <a:t>2/8/2023</a:t>
             </a:fld>
             <a:endParaRPr lang="en-US"/>
           </a:p>
@@ -3554,7 +3664,7 @@
           <a:p>
             <a:fld id="{0560A9CD-0304-4E0B-9E82-E7E0115DE05B}" type="datetimeFigureOut">
               <a:rPr lang="en-US" smtClean="0"/>
-              <a:t>2/9/2022</a:t>
+              <a:t>2/8/2023</a:t>
             </a:fld>
             <a:endParaRPr lang="en-US"/>
           </a:p>
@@ -3649,7 +3759,7 @@
           <a:p>
             <a:fld id="{0560A9CD-0304-4E0B-9E82-E7E0115DE05B}" type="datetimeFigureOut">
               <a:rPr lang="en-US" smtClean="0"/>
-              <a:t>2/9/2022</a:t>
+              <a:t>2/8/2023</a:t>
             </a:fld>
             <a:endParaRPr lang="en-US"/>
           </a:p>
@@ -3924,7 +4034,7 @@
           <a:p>
             <a:fld id="{0560A9CD-0304-4E0B-9E82-E7E0115DE05B}" type="datetimeFigureOut">
               <a:rPr lang="en-US" smtClean="0"/>
-              <a:t>2/9/2022</a:t>
+              <a:t>2/8/2023</a:t>
             </a:fld>
             <a:endParaRPr lang="en-US"/>
           </a:p>
@@ -4176,7 +4286,7 @@
           <a:p>
             <a:fld id="{0560A9CD-0304-4E0B-9E82-E7E0115DE05B}" type="datetimeFigureOut">
               <a:rPr lang="en-US" smtClean="0"/>
-              <a:t>2/9/2022</a:t>
+              <a:t>2/8/2023</a:t>
             </a:fld>
             <a:endParaRPr lang="en-US"/>
           </a:p>
@@ -4387,7 +4497,7 @@
           <a:p>
             <a:fld id="{0560A9CD-0304-4E0B-9E82-E7E0115DE05B}" type="datetimeFigureOut">
               <a:rPr lang="en-US" smtClean="0"/>
-              <a:t>2/9/2022</a:t>
+              <a:t>2/8/2023</a:t>
             </a:fld>
             <a:endParaRPr lang="en-US"/>
           </a:p>
@@ -8170,6 +8280,49 @@
           </a:p>
         </p:txBody>
       </p:sp>
+      <p:sp>
+        <p:nvSpPr>
+          <p:cNvPr id="5" name="TextBox 4">
+            <a:extLst>
+              <a:ext uri="{FF2B5EF4-FFF2-40B4-BE49-F238E27FC236}">
+                <a16:creationId xmlns:a16="http://schemas.microsoft.com/office/drawing/2014/main" id="{7CADA278-923D-143B-3BB6-1FEE8AB4BB03}"/>
+              </a:ext>
+            </a:extLst>
+          </p:cNvPr>
+          <p:cNvSpPr txBox="1"/>
+          <p:nvPr/>
+        </p:nvSpPr>
+        <p:spPr>
+          <a:xfrm>
+            <a:off x="9833595" y="6440056"/>
+            <a:ext cx="2241635" cy="369332"/>
+          </a:xfrm>
+          <a:prstGeom prst="rect">
+            <a:avLst/>
+          </a:prstGeom>
+          <a:noFill/>
+        </p:spPr>
+        <p:txBody>
+          <a:bodyPr wrap="square">
+            <a:spAutoFit/>
+          </a:bodyPr>
+          <a:lstStyle/>
+          <a:p>
+            <a:pPr algn="r"/>
+            <a:r>
+              <a:rPr lang="da-DK" dirty="0"/>
+              <a:t>Try </a:t>
+            </a:r>
+            <a:r>
+              <a:rPr lang="da-DK" dirty="0">
+                <a:hlinkClick r:id="rId3"/>
+              </a:rPr>
+              <a:t>pythontutor.com</a:t>
+            </a:r>
+            <a:endParaRPr lang="da-DK" dirty="0"/>
+          </a:p>
+        </p:txBody>
+      </p:sp>
     </p:spTree>
     <p:extLst>
       <p:ext uri="{BB962C8B-B14F-4D97-AF65-F5344CB8AC3E}">
@@ -8241,6 +8394,59 @@
                       </p:childTnLst>
                     </p:cTn>
                   </p:par>
+                  <p:par>
+                    <p:cTn id="8" fill="hold">
+                      <p:stCondLst>
+                        <p:cond delay="indefinite"/>
+                      </p:stCondLst>
+                      <p:childTnLst>
+                        <p:par>
+                          <p:cTn id="9" fill="hold">
+                            <p:stCondLst>
+                              <p:cond delay="0"/>
+                            </p:stCondLst>
+                            <p:childTnLst>
+                              <p:par>
+                                <p:cTn id="10" presetID="10" presetClass="entr" presetSubtype="0" fill="hold" grpId="0" nodeType="clickEffect">
+                                  <p:stCondLst>
+                                    <p:cond delay="0"/>
+                                  </p:stCondLst>
+                                  <p:childTnLst>
+                                    <p:set>
+                                      <p:cBhvr>
+                                        <p:cTn id="11" dur="1" fill="hold">
+                                          <p:stCondLst>
+                                            <p:cond delay="0"/>
+                                          </p:stCondLst>
+                                        </p:cTn>
+                                        <p:tgtEl>
+                                          <p:spTgt spid="5"/>
+                                        </p:tgtEl>
+                                        <p:attrNameLst>
+                                          <p:attrName>style.visibility</p:attrName>
+                                        </p:attrNameLst>
+                                      </p:cBhvr>
+                                      <p:to>
+                                        <p:strVal val="visible"/>
+                                      </p:to>
+                                    </p:set>
+                                    <p:animEffect transition="in" filter="fade">
+                                      <p:cBhvr>
+                                        <p:cTn id="12" dur="500"/>
+                                        <p:tgtEl>
+                                          <p:spTgt spid="5"/>
+                                        </p:tgtEl>
+                                      </p:cBhvr>
+                                    </p:animEffect>
+                                  </p:childTnLst>
+                                </p:cTn>
+                              </p:par>
+                            </p:childTnLst>
+                          </p:cTn>
+                        </p:par>
+                      </p:childTnLst>
+                    </p:cTn>
+                  </p:par>
                 </p:childTnLst>
               </p:cTn>
               <p:prevCondLst>
@@ -8264,6 +8470,7 @@
     </p:tnLst>
     <p:bldLst>
       <p:bldP spid="32" grpId="0" animBg="1"/>
+      <p:bldP spid="5" grpId="0"/>
     </p:bldLst>
   </p:timing>
 </p:sld>
@@ -16237,8 +16444,36 @@
                 <a:latin typeface="Courier New" panose="02070309020205020404" pitchFamily="49" charset="0"/>
                 <a:cs typeface="Courier New" panose="02070309020205020404" pitchFamily="49" charset="0"/>
               </a:rPr>
-              <a:t> e in L</a:t>
-            </a:r>
+              <a:t> e in L </a:t>
+            </a:r>
+            <a:r>
+              <a:rPr lang="en-US" dirty="0"/>
+              <a:t>(returns </a:t>
+            </a:r>
+            <a:r>
+              <a:rPr lang="en-US" dirty="0">
+                <a:latin typeface="Courier"/>
+              </a:rPr>
+              <a:t>True</a:t>
+            </a:r>
+            <a:r>
+              <a:rPr lang="en-US" dirty="0"/>
+              <a:t> or </a:t>
+            </a:r>
+            <a:r>
+              <a:rPr lang="en-US" dirty="0">
+                <a:latin typeface="Courier"/>
+              </a:rPr>
+              <a:t>False</a:t>
+            </a:r>
+            <a:r>
+              <a:rPr lang="en-US" dirty="0"/>
+              <a:t>)</a:t>
+            </a:r>
+            <a:endParaRPr lang="en-US" dirty="0">
+              <a:latin typeface="Courier"/>
+              <a:cs typeface="Courier New" panose="02070309020205020404" pitchFamily="49" charset="0"/>
+            </a:endParaRPr>
           </a:p>
           <a:p>
             <a:r>
@@ -16291,8 +16526,27 @@
                 <a:latin typeface="Courier New" panose="02070309020205020404" pitchFamily="49" charset="0"/>
                 <a:cs typeface="Courier New" panose="02070309020205020404" pitchFamily="49" charset="0"/>
               </a:rPr>
-              <a:t> e not in L</a:t>
-            </a:r>
+              <a:t> e not in L </a:t>
+            </a:r>
+            <a:r>
+              <a:rPr lang="en-US" dirty="0"/>
+              <a:t>(same as</a:t>
+            </a:r>
+            <a:r>
+              <a:rPr lang="en-US" dirty="0">
+                <a:latin typeface="Courier New" panose="02070309020205020404" pitchFamily="49" charset="0"/>
+                <a:cs typeface="Courier New" panose="02070309020205020404" pitchFamily="49" charset="0"/>
+              </a:rPr>
+              <a:t> not e in L</a:t>
+            </a:r>
+            <a:r>
+              <a:rPr lang="en-US" dirty="0"/>
+              <a:t>)</a:t>
+            </a:r>
+            <a:endParaRPr lang="en-US" dirty="0">
+              <a:latin typeface="Courier New" panose="02070309020205020404" pitchFamily="49" charset="0"/>
+              <a:cs typeface="Courier New" panose="02070309020205020404" pitchFamily="49" charset="0"/>
+            </a:endParaRPr>
           </a:p>
           <a:p>
             <a:r>
@@ -25634,7 +25888,7 @@
           <p:nvPr>
             <p:extLst>
               <p:ext uri="{D42A27DB-BD31-4B8C-83A1-F6EECF244321}">
-                <p14:modId xmlns:p14="http://schemas.microsoft.com/office/powerpoint/2010/main" val="1764404197"/>
+                <p14:modId xmlns:p14="http://schemas.microsoft.com/office/powerpoint/2010/main" val="1105276637"/>
               </p:ext>
             </p:extLst>
           </p:nvPr>
@@ -25961,7 +26215,29 @@
                           <a:latin typeface="Courier New" panose="02070309020205020404" pitchFamily="49" charset="0"/>
                           <a:cs typeface="Courier New" panose="02070309020205020404" pitchFamily="49" charset="0"/>
                         </a:rPr>
-                        <a:t>del L[i]  </a:t>
+                        <a:t>del L[i</a:t>
+                      </a:r>
+                      <a:r>
+                        <a:rPr lang="en-US" sz="1400" b="1">
+                          <a:solidFill>
+                            <a:srgbClr val="C00000"/>
+                          </a:solidFill>
+                          <a:latin typeface="Courier New" panose="02070309020205020404" pitchFamily="49" charset="0"/>
+                          <a:cs typeface="Courier New" panose="02070309020205020404" pitchFamily="49" charset="0"/>
+                        </a:rPr>
+                        <a:t>]       </a:t>
+                      </a:r>
+                      <a:r>
+                        <a:rPr lang="en-US" sz="1400" b="1">
+                          <a:solidFill>
+                            <a:schemeClr val="bg1">
+                              <a:lumMod val="50000"/>
+                            </a:schemeClr>
+                          </a:solidFill>
+                          <a:latin typeface="Courier New" panose="02070309020205020404" pitchFamily="49" charset="0"/>
+                          <a:cs typeface="Courier New" panose="02070309020205020404" pitchFamily="49" charset="0"/>
+                        </a:rPr>
+                        <a:t># </a:t>
                       </a:r>
                       <a:r>
                         <a:rPr lang="en-US" sz="1400" b="1" dirty="0">
@@ -25973,7 +26249,7 @@
                           <a:latin typeface="Courier New" panose="02070309020205020404" pitchFamily="49" charset="0"/>
                           <a:cs typeface="Courier New" panose="02070309020205020404" pitchFamily="49" charset="0"/>
                         </a:rPr>
-                        <a:t># remove L[i] from L</a:t>
+                        <a:t>remove L[i] from L</a:t>
                       </a:r>
                     </a:p>
                     <a:p>

</xml_diff>

<commit_message>
all-slides.pdf lists.pdf lists.pptx operations.pdf operations.pptx
</commit_message>
<xml_diff>
--- a/ipsa/slides/lists.pptx
+++ b/ipsa/slides/lists.pptx
@@ -144,8 +144,156 @@
 </p:presentation>
 </file>
 
+<file path=ppt/revisionInfo.xml><?xml version="1.0" encoding="utf-8"?>
+<p1510:revInfo xmlns:a="http://schemas.openxmlformats.org/drawingml/2006/main" xmlns:r="http://schemas.openxmlformats.org/officeDocument/2006/relationships" xmlns:p1510="http://schemas.microsoft.com/office/powerpoint/2015/10/main">
+  <p1510:revLst>
+    <p1510:client id="{9DADA4EC-0B2F-48A6-AAA2-B687273D3C4F}" v="8" dt="2025-05-13T12:55:51.491"/>
+  </p1510:revLst>
+</p1510:revInfo>
+</file>
+
 <file path=ppt/changesInfos/changesInfo1.xml><?xml version="1.0" encoding="utf-8"?>
 <pc:chgInfo xmlns:a="http://schemas.openxmlformats.org/drawingml/2006/main" xmlns:r="http://schemas.openxmlformats.org/officeDocument/2006/relationships" xmlns:ac="http://schemas.microsoft.com/office/drawing/2013/main/command" xmlns:pc="http://schemas.microsoft.com/office/powerpoint/2013/main/command">
+  <pc:docChgLst>
+    <pc:chgData name="Gerth Stølting Brodal" userId="04ef4784-6591-4f86-a140-f5c3b108582a" providerId="ADAL" clId="{7DE2B4C3-C34C-4130-8A96-9CF827B1134B}"/>
+    <pc:docChg chg="custSel modSld">
+      <pc:chgData name="Gerth Stølting Brodal" userId="04ef4784-6591-4f86-a140-f5c3b108582a" providerId="ADAL" clId="{7DE2B4C3-C34C-4130-8A96-9CF827B1134B}" dt="2021-02-11T21:41:03.692" v="94" actId="114"/>
+      <pc:docMkLst>
+        <pc:docMk/>
+      </pc:docMkLst>
+      <pc:sldChg chg="modSp mod">
+        <pc:chgData name="Gerth Stølting Brodal" userId="04ef4784-6591-4f86-a140-f5c3b108582a" providerId="ADAL" clId="{7DE2B4C3-C34C-4130-8A96-9CF827B1134B}" dt="2021-02-11T21:41:03.692" v="94" actId="114"/>
+        <pc:sldMkLst>
+          <pc:docMk/>
+          <pc:sldMk cId="1841815763" sldId="485"/>
+        </pc:sldMkLst>
+      </pc:sldChg>
+      <pc:sldChg chg="modNotesTx">
+        <pc:chgData name="Gerth Stølting Brodal" userId="04ef4784-6591-4f86-a140-f5c3b108582a" providerId="ADAL" clId="{7DE2B4C3-C34C-4130-8A96-9CF827B1134B}" dt="2021-02-11T20:05:05.680" v="86" actId="20577"/>
+        <pc:sldMkLst>
+          <pc:docMk/>
+          <pc:sldMk cId="3580155105" sldId="487"/>
+        </pc:sldMkLst>
+      </pc:sldChg>
+    </pc:docChg>
+  </pc:docChgLst>
+  <pc:docChgLst>
+    <pc:chgData name="Gerth Stølting Brodal" userId="04ef4784-6591-4f86-a140-f5c3b108582a" providerId="ADAL" clId="{48BD50EB-D70C-4B82-BF38-DF8E8FD7B8E8}"/>
+    <pc:docChg chg="undo redo custSel modSld">
+      <pc:chgData name="Gerth Stølting Brodal" userId="04ef4784-6591-4f86-a140-f5c3b108582a" providerId="ADAL" clId="{48BD50EB-D70C-4B82-BF38-DF8E8FD7B8E8}" dt="2023-07-15T11:46:31.435" v="61" actId="313"/>
+      <pc:docMkLst>
+        <pc:docMk/>
+      </pc:docMkLst>
+      <pc:sldChg chg="modSp mod addAnim delAnim">
+        <pc:chgData name="Gerth Stølting Brodal" userId="04ef4784-6591-4f86-a140-f5c3b108582a" providerId="ADAL" clId="{48BD50EB-D70C-4B82-BF38-DF8E8FD7B8E8}" dt="2023-07-15T11:46:31.435" v="61" actId="313"/>
+        <pc:sldMkLst>
+          <pc:docMk/>
+          <pc:sldMk cId="317541545" sldId="490"/>
+        </pc:sldMkLst>
+      </pc:sldChg>
+      <pc:sldChg chg="modSp mod addAnim delAnim">
+        <pc:chgData name="Gerth Stølting Brodal" userId="04ef4784-6591-4f86-a140-f5c3b108582a" providerId="ADAL" clId="{48BD50EB-D70C-4B82-BF38-DF8E8FD7B8E8}" dt="2023-07-15T11:37:48.770" v="14" actId="313"/>
+        <pc:sldMkLst>
+          <pc:docMk/>
+          <pc:sldMk cId="3433855882" sldId="491"/>
+        </pc:sldMkLst>
+      </pc:sldChg>
+      <pc:sldChg chg="modSp mod">
+        <pc:chgData name="Gerth Stølting Brodal" userId="04ef4784-6591-4f86-a140-f5c3b108582a" providerId="ADAL" clId="{48BD50EB-D70C-4B82-BF38-DF8E8FD7B8E8}" dt="2023-07-15T11:38:03.015" v="21" actId="313"/>
+        <pc:sldMkLst>
+          <pc:docMk/>
+          <pc:sldMk cId="144530098" sldId="507"/>
+        </pc:sldMkLst>
+      </pc:sldChg>
+      <pc:sldChg chg="addSp delSp modSp mod">
+        <pc:chgData name="Gerth Stølting Brodal" userId="04ef4784-6591-4f86-a140-f5c3b108582a" providerId="ADAL" clId="{48BD50EB-D70C-4B82-BF38-DF8E8FD7B8E8}" dt="2023-07-15T11:46:25.812" v="59" actId="478"/>
+        <pc:sldMkLst>
+          <pc:docMk/>
+          <pc:sldMk cId="637895129" sldId="513"/>
+        </pc:sldMkLst>
+      </pc:sldChg>
+    </pc:docChg>
+  </pc:docChgLst>
+  <pc:docChgLst>
+    <pc:chgData name="Gerth Stølting Brodal" userId="04ef4784-6591-4f86-a140-f5c3b108582a" providerId="ADAL" clId="{9DADA4EC-0B2F-48A6-AAA2-B687273D3C4F}"/>
+    <pc:docChg chg="custSel modSld">
+      <pc:chgData name="Gerth Stølting Brodal" userId="04ef4784-6591-4f86-a140-f5c3b108582a" providerId="ADAL" clId="{9DADA4EC-0B2F-48A6-AAA2-B687273D3C4F}" dt="2025-05-13T12:57:09.528" v="284" actId="1038"/>
+      <pc:docMkLst>
+        <pc:docMk/>
+      </pc:docMkLst>
+      <pc:sldChg chg="addSp modSp mod">
+        <pc:chgData name="Gerth Stølting Brodal" userId="04ef4784-6591-4f86-a140-f5c3b108582a" providerId="ADAL" clId="{9DADA4EC-0B2F-48A6-AAA2-B687273D3C4F}" dt="2025-05-13T12:57:09.528" v="284" actId="1038"/>
+        <pc:sldMkLst>
+          <pc:docMk/>
+          <pc:sldMk cId="1841815763" sldId="485"/>
+        </pc:sldMkLst>
+        <pc:spChg chg="mod">
+          <ac:chgData name="Gerth Stølting Brodal" userId="04ef4784-6591-4f86-a140-f5c3b108582a" providerId="ADAL" clId="{9DADA4EC-0B2F-48A6-AAA2-B687273D3C4F}" dt="2025-05-13T12:42:04.484" v="0" actId="14100"/>
+          <ac:spMkLst>
+            <pc:docMk/>
+            <pc:sldMk cId="1841815763" sldId="485"/>
+            <ac:spMk id="2" creationId="{00000000-0000-0000-0000-000000000000}"/>
+          </ac:spMkLst>
+        </pc:spChg>
+        <pc:spChg chg="add mod">
+          <ac:chgData name="Gerth Stølting Brodal" userId="04ef4784-6591-4f86-a140-f5c3b108582a" providerId="ADAL" clId="{9DADA4EC-0B2F-48A6-AAA2-B687273D3C4F}" dt="2025-05-13T12:57:09.528" v="284" actId="1038"/>
+          <ac:spMkLst>
+            <pc:docMk/>
+            <pc:sldMk cId="1841815763" sldId="485"/>
+            <ac:spMk id="6" creationId="{0E4A98EC-37C4-8241-363F-9C13D1E21920}"/>
+          </ac:spMkLst>
+        </pc:spChg>
+        <pc:spChg chg="add mod">
+          <ac:chgData name="Gerth Stølting Brodal" userId="04ef4784-6591-4f86-a140-f5c3b108582a" providerId="ADAL" clId="{9DADA4EC-0B2F-48A6-AAA2-B687273D3C4F}" dt="2025-05-13T12:56:31.840" v="267" actId="14100"/>
+          <ac:spMkLst>
+            <pc:docMk/>
+            <pc:sldMk cId="1841815763" sldId="485"/>
+            <ac:spMk id="12" creationId="{1A4C4B8A-3EAA-279A-8739-939276934ECA}"/>
+          </ac:spMkLst>
+        </pc:spChg>
+        <pc:picChg chg="add mod">
+          <ac:chgData name="Gerth Stølting Brodal" userId="04ef4784-6591-4f86-a140-f5c3b108582a" providerId="ADAL" clId="{9DADA4EC-0B2F-48A6-AAA2-B687273D3C4F}" dt="2025-05-13T12:52:51.228" v="179" actId="1076"/>
+          <ac:picMkLst>
+            <pc:docMk/>
+            <pc:sldMk cId="1841815763" sldId="485"/>
+            <ac:picMk id="5" creationId="{8AF81D18-9BA3-35AB-B1A7-11A30B22979D}"/>
+          </ac:picMkLst>
+        </pc:picChg>
+      </pc:sldChg>
+    </pc:docChg>
+  </pc:docChgLst>
+  <pc:docChgLst>
+    <pc:chgData name="Gerth Stølting Brodal" userId="04ef4784-6591-4f86-a140-f5c3b108582a" providerId="ADAL" clId="{DBC7B104-988F-491C-9F36-B33E053AAD93}"/>
+    <pc:docChg chg="custSel modSld">
+      <pc:chgData name="Gerth Stølting Brodal" userId="04ef4784-6591-4f86-a140-f5c3b108582a" providerId="ADAL" clId="{DBC7B104-988F-491C-9F36-B33E053AAD93}" dt="2022-02-09T11:25:47.588" v="10" actId="20577"/>
+      <pc:docMkLst>
+        <pc:docMk/>
+      </pc:docMkLst>
+      <pc:sldChg chg="modNotesTx">
+        <pc:chgData name="Gerth Stølting Brodal" userId="04ef4784-6591-4f86-a140-f5c3b108582a" providerId="ADAL" clId="{DBC7B104-988F-491C-9F36-B33E053AAD93}" dt="2022-02-09T11:25:47.588" v="10" actId="20577"/>
+        <pc:sldMkLst>
+          <pc:docMk/>
+          <pc:sldMk cId="3145035976" sldId="492"/>
+        </pc:sldMkLst>
+      </pc:sldChg>
+    </pc:docChg>
+  </pc:docChgLst>
+  <pc:docChgLst>
+    <pc:chgData name="Gerth Stølting Brodal" userId="04ef4784-6591-4f86-a140-f5c3b108582a" providerId="ADAL" clId="{CF9158FC-193B-4602-9DF7-E8D8B4ED0BA3}"/>
+    <pc:docChg chg="undo redo custSel addSld modSld">
+      <pc:chgData name="Gerth Stølting Brodal" userId="04ef4784-6591-4f86-a140-f5c3b108582a" providerId="ADAL" clId="{CF9158FC-193B-4602-9DF7-E8D8B4ED0BA3}" dt="2023-10-31T11:50:02.173" v="713" actId="1076"/>
+      <pc:docMkLst>
+        <pc:docMk/>
+      </pc:docMkLst>
+      <pc:sldChg chg="addSp delSp modSp new mod modNotesTx">
+        <pc:chgData name="Gerth Stølting Brodal" userId="04ef4784-6591-4f86-a140-f5c3b108582a" providerId="ADAL" clId="{CF9158FC-193B-4602-9DF7-E8D8B4ED0BA3}" dt="2023-10-31T11:50:02.173" v="713" actId="1076"/>
+        <pc:sldMkLst>
+          <pc:docMk/>
+          <pc:sldMk cId="1292498751" sldId="517"/>
+        </pc:sldMkLst>
+      </pc:sldChg>
+    </pc:docChg>
+  </pc:docChgLst>
   <pc:docChgLst>
     <pc:chgData name="Gerth Stølting Brodal" userId="04ef4784-6591-4f86-a140-f5c3b108582a" providerId="ADAL" clId="{DB78D39E-575E-45E5-B6C0-876F5A9D7068}"/>
     <pc:docChg chg="undo redo custSel modSld">
@@ -228,43 +376,6 @@
     </pc:docChg>
   </pc:docChgLst>
   <pc:docChgLst>
-    <pc:chgData name="Gerth Stølting Brodal" userId="04ef4784-6591-4f86-a140-f5c3b108582a" providerId="ADAL" clId="{48BD50EB-D70C-4B82-BF38-DF8E8FD7B8E8}"/>
-    <pc:docChg chg="undo redo custSel modSld">
-      <pc:chgData name="Gerth Stølting Brodal" userId="04ef4784-6591-4f86-a140-f5c3b108582a" providerId="ADAL" clId="{48BD50EB-D70C-4B82-BF38-DF8E8FD7B8E8}" dt="2023-07-15T11:46:31.435" v="61" actId="313"/>
-      <pc:docMkLst>
-        <pc:docMk/>
-      </pc:docMkLst>
-      <pc:sldChg chg="modSp mod addAnim delAnim">
-        <pc:chgData name="Gerth Stølting Brodal" userId="04ef4784-6591-4f86-a140-f5c3b108582a" providerId="ADAL" clId="{48BD50EB-D70C-4B82-BF38-DF8E8FD7B8E8}" dt="2023-07-15T11:46:31.435" v="61" actId="313"/>
-        <pc:sldMkLst>
-          <pc:docMk/>
-          <pc:sldMk cId="317541545" sldId="490"/>
-        </pc:sldMkLst>
-      </pc:sldChg>
-      <pc:sldChg chg="modSp mod addAnim delAnim">
-        <pc:chgData name="Gerth Stølting Brodal" userId="04ef4784-6591-4f86-a140-f5c3b108582a" providerId="ADAL" clId="{48BD50EB-D70C-4B82-BF38-DF8E8FD7B8E8}" dt="2023-07-15T11:37:48.770" v="14" actId="313"/>
-        <pc:sldMkLst>
-          <pc:docMk/>
-          <pc:sldMk cId="3433855882" sldId="491"/>
-        </pc:sldMkLst>
-      </pc:sldChg>
-      <pc:sldChg chg="modSp mod">
-        <pc:chgData name="Gerth Stølting Brodal" userId="04ef4784-6591-4f86-a140-f5c3b108582a" providerId="ADAL" clId="{48BD50EB-D70C-4B82-BF38-DF8E8FD7B8E8}" dt="2023-07-15T11:38:03.015" v="21" actId="313"/>
-        <pc:sldMkLst>
-          <pc:docMk/>
-          <pc:sldMk cId="144530098" sldId="507"/>
-        </pc:sldMkLst>
-      </pc:sldChg>
-      <pc:sldChg chg="addSp delSp modSp mod">
-        <pc:chgData name="Gerth Stølting Brodal" userId="04ef4784-6591-4f86-a140-f5c3b108582a" providerId="ADAL" clId="{48BD50EB-D70C-4B82-BF38-DF8E8FD7B8E8}" dt="2023-07-15T11:46:25.812" v="59" actId="478"/>
-        <pc:sldMkLst>
-          <pc:docMk/>
-          <pc:sldMk cId="637895129" sldId="513"/>
-        </pc:sldMkLst>
-      </pc:sldChg>
-    </pc:docChg>
-  </pc:docChgLst>
-  <pc:docChgLst>
     <pc:chgData name="Gerth Stølting Brodal" userId="04ef4784-6591-4f86-a140-f5c3b108582a" providerId="ADAL" clId="{155CD946-55B5-49F4-A11E-1EF807E1FDB7}"/>
     <pc:docChg chg="undo custSel modSld">
       <pc:chgData name="Gerth Stølting Brodal" userId="04ef4784-6591-4f86-a140-f5c3b108582a" providerId="ADAL" clId="{155CD946-55B5-49F4-A11E-1EF807E1FDB7}" dt="2024-02-07T07:34:04.180" v="375" actId="1035"/>
@@ -304,61 +415,6 @@
         <pc:sldMkLst>
           <pc:docMk/>
           <pc:sldMk cId="2254085997" sldId="511"/>
-        </pc:sldMkLst>
-      </pc:sldChg>
-    </pc:docChg>
-  </pc:docChgLst>
-  <pc:docChgLst>
-    <pc:chgData name="Gerth Stølting Brodal" userId="04ef4784-6591-4f86-a140-f5c3b108582a" providerId="ADAL" clId="{DBC7B104-988F-491C-9F36-B33E053AAD93}"/>
-    <pc:docChg chg="custSel modSld">
-      <pc:chgData name="Gerth Stølting Brodal" userId="04ef4784-6591-4f86-a140-f5c3b108582a" providerId="ADAL" clId="{DBC7B104-988F-491C-9F36-B33E053AAD93}" dt="2022-02-09T11:25:47.588" v="10" actId="20577"/>
-      <pc:docMkLst>
-        <pc:docMk/>
-      </pc:docMkLst>
-      <pc:sldChg chg="modNotesTx">
-        <pc:chgData name="Gerth Stølting Brodal" userId="04ef4784-6591-4f86-a140-f5c3b108582a" providerId="ADAL" clId="{DBC7B104-988F-491C-9F36-B33E053AAD93}" dt="2022-02-09T11:25:47.588" v="10" actId="20577"/>
-        <pc:sldMkLst>
-          <pc:docMk/>
-          <pc:sldMk cId="3145035976" sldId="492"/>
-        </pc:sldMkLst>
-      </pc:sldChg>
-    </pc:docChg>
-  </pc:docChgLst>
-  <pc:docChgLst>
-    <pc:chgData name="Gerth Stølting Brodal" userId="04ef4784-6591-4f86-a140-f5c3b108582a" providerId="ADAL" clId="{7DE2B4C3-C34C-4130-8A96-9CF827B1134B}"/>
-    <pc:docChg chg="custSel modSld">
-      <pc:chgData name="Gerth Stølting Brodal" userId="04ef4784-6591-4f86-a140-f5c3b108582a" providerId="ADAL" clId="{7DE2B4C3-C34C-4130-8A96-9CF827B1134B}" dt="2021-02-11T21:41:03.692" v="94" actId="114"/>
-      <pc:docMkLst>
-        <pc:docMk/>
-      </pc:docMkLst>
-      <pc:sldChg chg="modSp mod">
-        <pc:chgData name="Gerth Stølting Brodal" userId="04ef4784-6591-4f86-a140-f5c3b108582a" providerId="ADAL" clId="{7DE2B4C3-C34C-4130-8A96-9CF827B1134B}" dt="2021-02-11T21:41:03.692" v="94" actId="114"/>
-        <pc:sldMkLst>
-          <pc:docMk/>
-          <pc:sldMk cId="1841815763" sldId="485"/>
-        </pc:sldMkLst>
-      </pc:sldChg>
-      <pc:sldChg chg="modNotesTx">
-        <pc:chgData name="Gerth Stølting Brodal" userId="04ef4784-6591-4f86-a140-f5c3b108582a" providerId="ADAL" clId="{7DE2B4C3-C34C-4130-8A96-9CF827B1134B}" dt="2021-02-11T20:05:05.680" v="86" actId="20577"/>
-        <pc:sldMkLst>
-          <pc:docMk/>
-          <pc:sldMk cId="3580155105" sldId="487"/>
-        </pc:sldMkLst>
-      </pc:sldChg>
-    </pc:docChg>
-  </pc:docChgLst>
-  <pc:docChgLst>
-    <pc:chgData name="Gerth Stølting Brodal" userId="04ef4784-6591-4f86-a140-f5c3b108582a" providerId="ADAL" clId="{CF9158FC-193B-4602-9DF7-E8D8B4ED0BA3}"/>
-    <pc:docChg chg="undo redo custSel addSld modSld">
-      <pc:chgData name="Gerth Stølting Brodal" userId="04ef4784-6591-4f86-a140-f5c3b108582a" providerId="ADAL" clId="{CF9158FC-193B-4602-9DF7-E8D8B4ED0BA3}" dt="2023-10-31T11:50:02.173" v="713" actId="1076"/>
-      <pc:docMkLst>
-        <pc:docMk/>
-      </pc:docMkLst>
-      <pc:sldChg chg="addSp delSp modSp new mod modNotesTx">
-        <pc:chgData name="Gerth Stølting Brodal" userId="04ef4784-6591-4f86-a140-f5c3b108582a" providerId="ADAL" clId="{CF9158FC-193B-4602-9DF7-E8D8B4ED0BA3}" dt="2023-10-31T11:50:02.173" v="713" actId="1076"/>
-        <pc:sldMkLst>
-          <pc:docMk/>
-          <pc:sldMk cId="1292498751" sldId="517"/>
         </pc:sldMkLst>
       </pc:sldChg>
     </pc:docChg>
@@ -448,7 +504,7 @@
           <a:p>
             <a:fld id="{FB1A172F-81D4-4DC4-9113-1DBD56EC3646}" type="datetimeFigureOut">
               <a:rPr lang="en-US" smtClean="0"/>
-              <a:t>2/5/2025</a:t>
+              <a:t>5/13/2025</a:t>
             </a:fld>
             <a:endParaRPr lang="en-US"/>
           </a:p>
@@ -2601,7 +2657,7 @@
           <a:p>
             <a:fld id="{0560A9CD-0304-4E0B-9E82-E7E0115DE05B}" type="datetimeFigureOut">
               <a:rPr lang="en-US" smtClean="0"/>
-              <a:t>2/5/2025</a:t>
+              <a:t>5/13/2025</a:t>
             </a:fld>
             <a:endParaRPr lang="en-US"/>
           </a:p>
@@ -2769,7 +2825,7 @@
           <a:p>
             <a:fld id="{0560A9CD-0304-4E0B-9E82-E7E0115DE05B}" type="datetimeFigureOut">
               <a:rPr lang="en-US" smtClean="0"/>
-              <a:t>2/5/2025</a:t>
+              <a:t>5/13/2025</a:t>
             </a:fld>
             <a:endParaRPr lang="en-US"/>
           </a:p>
@@ -2947,7 +3003,7 @@
           <a:p>
             <a:fld id="{0560A9CD-0304-4E0B-9E82-E7E0115DE05B}" type="datetimeFigureOut">
               <a:rPr lang="en-US" smtClean="0"/>
-              <a:t>2/5/2025</a:t>
+              <a:t>5/13/2025</a:t>
             </a:fld>
             <a:endParaRPr lang="en-US"/>
           </a:p>
@@ -3124,7 +3180,7 @@
           <a:p>
             <a:fld id="{0560A9CD-0304-4E0B-9E82-E7E0115DE05B}" type="datetimeFigureOut">
               <a:rPr lang="en-US" smtClean="0"/>
-              <a:t>2/5/2025</a:t>
+              <a:t>5/13/2025</a:t>
             </a:fld>
             <a:endParaRPr lang="en-US"/>
           </a:p>
@@ -3369,7 +3425,7 @@
           <a:p>
             <a:fld id="{0560A9CD-0304-4E0B-9E82-E7E0115DE05B}" type="datetimeFigureOut">
               <a:rPr lang="en-US" smtClean="0"/>
-              <a:t>2/5/2025</a:t>
+              <a:t>5/13/2025</a:t>
             </a:fld>
             <a:endParaRPr lang="en-US"/>
           </a:p>
@@ -3598,7 +3654,7 @@
           <a:p>
             <a:fld id="{0560A9CD-0304-4E0B-9E82-E7E0115DE05B}" type="datetimeFigureOut">
               <a:rPr lang="en-US" smtClean="0"/>
-              <a:t>2/5/2025</a:t>
+              <a:t>5/13/2025</a:t>
             </a:fld>
             <a:endParaRPr lang="en-US"/>
           </a:p>
@@ -3962,7 +4018,7 @@
           <a:p>
             <a:fld id="{0560A9CD-0304-4E0B-9E82-E7E0115DE05B}" type="datetimeFigureOut">
               <a:rPr lang="en-US" smtClean="0"/>
-              <a:t>2/5/2025</a:t>
+              <a:t>5/13/2025</a:t>
             </a:fld>
             <a:endParaRPr lang="en-US"/>
           </a:p>
@@ -4079,7 +4135,7 @@
           <a:p>
             <a:fld id="{0560A9CD-0304-4E0B-9E82-E7E0115DE05B}" type="datetimeFigureOut">
               <a:rPr lang="en-US" smtClean="0"/>
-              <a:t>2/5/2025</a:t>
+              <a:t>5/13/2025</a:t>
             </a:fld>
             <a:endParaRPr lang="en-US"/>
           </a:p>
@@ -4174,7 +4230,7 @@
           <a:p>
             <a:fld id="{0560A9CD-0304-4E0B-9E82-E7E0115DE05B}" type="datetimeFigureOut">
               <a:rPr lang="en-US" smtClean="0"/>
-              <a:t>2/5/2025</a:t>
+              <a:t>5/13/2025</a:t>
             </a:fld>
             <a:endParaRPr lang="en-US"/>
           </a:p>
@@ -4449,7 +4505,7 @@
           <a:p>
             <a:fld id="{0560A9CD-0304-4E0B-9E82-E7E0115DE05B}" type="datetimeFigureOut">
               <a:rPr lang="en-US" smtClean="0"/>
-              <a:t>2/5/2025</a:t>
+              <a:t>5/13/2025</a:t>
             </a:fld>
             <a:endParaRPr lang="en-US"/>
           </a:p>
@@ -4701,7 +4757,7 @@
           <a:p>
             <a:fld id="{0560A9CD-0304-4E0B-9E82-E7E0115DE05B}" type="datetimeFigureOut">
               <a:rPr lang="en-US" smtClean="0"/>
-              <a:t>2/5/2025</a:t>
+              <a:t>5/13/2025</a:t>
             </a:fld>
             <a:endParaRPr lang="en-US"/>
           </a:p>
@@ -4912,7 +4968,7 @@
           <a:p>
             <a:fld id="{0560A9CD-0304-4E0B-9E82-E7E0115DE05B}" type="datetimeFigureOut">
               <a:rPr lang="en-US" smtClean="0"/>
-              <a:t>2/5/2025</a:t>
+              <a:t>5/13/2025</a:t>
             </a:fld>
             <a:endParaRPr lang="en-US"/>
           </a:p>
@@ -19546,7 +19602,12 @@
             <p:ph type="title"/>
           </p:nvPr>
         </p:nvSpPr>
-        <p:spPr/>
+        <p:spPr>
+          <a:xfrm>
+            <a:off x="838200" y="365125"/>
+            <a:ext cx="6343073" cy="1325563"/>
+          </a:xfrm>
+        </p:spPr>
         <p:txBody>
           <a:bodyPr/>
           <a:lstStyle/>
@@ -20398,6 +20459,341 @@
           <a:p>
             <a:pPr algn="ctr"/>
             <a:endParaRPr lang="da-DK" dirty="0"/>
+          </a:p>
+        </p:txBody>
+      </p:sp>
+      <p:pic>
+        <p:nvPicPr>
+          <p:cNvPr id="5" name="Picture 4">
+            <a:extLst>
+              <a:ext uri="{FF2B5EF4-FFF2-40B4-BE49-F238E27FC236}">
+                <a16:creationId xmlns:a16="http://schemas.microsoft.com/office/drawing/2014/main" id="{8AF81D18-9BA3-35AB-B1A7-11A30B22979D}"/>
+              </a:ext>
+            </a:extLst>
+          </p:cNvPr>
+          <p:cNvPicPr>
+            <a:picLocks noChangeAspect="1"/>
+          </p:cNvPicPr>
+          <p:nvPr/>
+        </p:nvPicPr>
+        <p:blipFill>
+          <a:blip r:embed="rId4" cstate="print">
+            <a:extLst>
+              <a:ext uri="{28A0092B-C50C-407E-A947-70E740481C1C}">
+                <a14:useLocalDpi xmlns:a14="http://schemas.microsoft.com/office/drawing/2010/main" val="0"/>
+              </a:ext>
+            </a:extLst>
+          </a:blip>
+          <a:stretch>
+            <a:fillRect/>
+          </a:stretch>
+        </p:blipFill>
+        <p:spPr>
+          <a:xfrm>
+            <a:off x="7933788" y="223549"/>
+            <a:ext cx="487666" cy="405904"/>
+          </a:xfrm>
+          <a:prstGeom prst="rect">
+            <a:avLst/>
+          </a:prstGeom>
+        </p:spPr>
+      </p:pic>
+      <p:sp>
+        <p:nvSpPr>
+          <p:cNvPr id="6" name="TextBox 5">
+            <a:extLst>
+              <a:ext uri="{FF2B5EF4-FFF2-40B4-BE49-F238E27FC236}">
+                <a16:creationId xmlns:a16="http://schemas.microsoft.com/office/drawing/2014/main" id="{0E4A98EC-37C4-8241-363F-9C13D1E21920}"/>
+              </a:ext>
+            </a:extLst>
+          </p:cNvPr>
+          <p:cNvSpPr txBox="1"/>
+          <p:nvPr/>
+        </p:nvSpPr>
+        <p:spPr>
+          <a:xfrm>
+            <a:off x="8418947" y="41566"/>
+            <a:ext cx="3708400" cy="954107"/>
+          </a:xfrm>
+          <a:prstGeom prst="rect">
+            <a:avLst/>
+          </a:prstGeom>
+          <a:noFill/>
+        </p:spPr>
+        <p:txBody>
+          <a:bodyPr wrap="square" rtlCol="0">
+            <a:spAutoFit/>
+          </a:bodyPr>
+          <a:lstStyle/>
+          <a:p>
+            <a:r>
+              <a:rPr lang="da-DK" sz="1400" dirty="0">
+                <a:latin typeface="Courier"/>
+              </a:rPr>
+              <a:t>L[-</a:t>
+            </a:r>
+            <a:r>
+              <a:rPr lang="da-DK" sz="1400" i="1" dirty="0" err="1">
+                <a:latin typeface="Courier"/>
+              </a:rPr>
+              <a:t>index</a:t>
+            </a:r>
+            <a:r>
+              <a:rPr lang="da-DK" sz="1400" dirty="0">
+                <a:latin typeface="Courier"/>
+              </a:rPr>
+              <a:t>] == L[len(L)-</a:t>
+            </a:r>
+            <a:r>
+              <a:rPr lang="da-DK" sz="1400" i="1" dirty="0" err="1">
+                <a:latin typeface="Courier"/>
+              </a:rPr>
+              <a:t>index</a:t>
+            </a:r>
+            <a:r>
+              <a:rPr lang="da-DK" sz="1400" dirty="0">
+                <a:latin typeface="Courier"/>
+              </a:rPr>
+              <a:t>]</a:t>
+            </a:r>
+          </a:p>
+          <a:p>
+            <a:r>
+              <a:rPr lang="da-DK" sz="1400" dirty="0"/>
+              <a:t>Negative </a:t>
+            </a:r>
+            <a:r>
+              <a:rPr lang="da-DK" sz="1400" dirty="0" err="1"/>
+              <a:t>indexing</a:t>
+            </a:r>
+            <a:r>
+              <a:rPr lang="da-DK" sz="1400" dirty="0"/>
+              <a:t> from the right is Python </a:t>
+            </a:r>
+            <a:r>
+              <a:rPr lang="da-DK" sz="1400" dirty="0" err="1"/>
+              <a:t>specific</a:t>
+            </a:r>
+            <a:r>
+              <a:rPr lang="da-DK" sz="1400" dirty="0"/>
+              <a:t>, and is </a:t>
+            </a:r>
+            <a:r>
+              <a:rPr lang="da-DK" sz="1400" dirty="0" err="1"/>
+              <a:t>e.g</a:t>
+            </a:r>
+            <a:r>
+              <a:rPr lang="da-DK" sz="1400" dirty="0"/>
+              <a:t>. not </a:t>
+            </a:r>
+            <a:r>
+              <a:rPr lang="da-DK" sz="1400" dirty="0" err="1"/>
+              <a:t>supported</a:t>
+            </a:r>
+            <a:r>
+              <a:rPr lang="da-DK" sz="1400" dirty="0"/>
+              <a:t> in Java, C, C++</a:t>
+            </a:r>
+          </a:p>
+          <a:p>
+            <a:endParaRPr lang="en-US" sz="1400" dirty="0">
+              <a:latin typeface="Courier"/>
+            </a:endParaRPr>
+          </a:p>
+        </p:txBody>
+      </p:sp>
+      <p:sp>
+        <p:nvSpPr>
+          <p:cNvPr id="12" name="Freeform 25">
+            <a:extLst>
+              <a:ext uri="{FF2B5EF4-FFF2-40B4-BE49-F238E27FC236}">
+                <a16:creationId xmlns:a16="http://schemas.microsoft.com/office/drawing/2014/main" id="{1A4C4B8A-3EAA-279A-8739-939276934ECA}"/>
+              </a:ext>
+            </a:extLst>
+          </p:cNvPr>
+          <p:cNvSpPr/>
+          <p:nvPr/>
+        </p:nvSpPr>
+        <p:spPr>
+          <a:xfrm flipV="1">
+            <a:off x="6068443" y="740287"/>
+            <a:ext cx="3976101" cy="1325009"/>
+          </a:xfrm>
+          <a:custGeom>
+            <a:avLst/>
+            <a:gdLst>
+              <a:gd name="connsiteX0" fmla="*/ 0 w 423793"/>
+              <a:gd name="connsiteY0" fmla="*/ 0 h 678729"/>
+              <a:gd name="connsiteX1" fmla="*/ 414780 w 423793"/>
+              <a:gd name="connsiteY1" fmla="*/ 325224 h 678729"/>
+              <a:gd name="connsiteX2" fmla="*/ 245097 w 423793"/>
+              <a:gd name="connsiteY2" fmla="*/ 678729 h 678729"/>
+              <a:gd name="connsiteX0" fmla="*/ 490194 w 918425"/>
+              <a:gd name="connsiteY0" fmla="*/ 0 h 499007"/>
+              <a:gd name="connsiteX1" fmla="*/ 904974 w 918425"/>
+              <a:gd name="connsiteY1" fmla="*/ 325224 h 499007"/>
+              <a:gd name="connsiteX2" fmla="*/ 0 w 918425"/>
+              <a:gd name="connsiteY2" fmla="*/ 499007 h 499007"/>
+              <a:gd name="connsiteX0" fmla="*/ 240384 w 907175"/>
+              <a:gd name="connsiteY0" fmla="*/ 0 h 822507"/>
+              <a:gd name="connsiteX1" fmla="*/ 904974 w 907175"/>
+              <a:gd name="connsiteY1" fmla="*/ 648724 h 822507"/>
+              <a:gd name="connsiteX2" fmla="*/ 0 w 907175"/>
+              <a:gd name="connsiteY2" fmla="*/ 822507 h 822507"/>
+              <a:gd name="connsiteX0" fmla="*/ 240384 w 603541"/>
+              <a:gd name="connsiteY0" fmla="*/ 0 h 822507"/>
+              <a:gd name="connsiteX1" fmla="*/ 598603 w 603541"/>
+              <a:gd name="connsiteY1" fmla="*/ 309818 h 822507"/>
+              <a:gd name="connsiteX2" fmla="*/ 0 w 603541"/>
+              <a:gd name="connsiteY2" fmla="*/ 822507 h 822507"/>
+              <a:gd name="connsiteX0" fmla="*/ 240384 w 598611"/>
+              <a:gd name="connsiteY0" fmla="*/ 0 h 822507"/>
+              <a:gd name="connsiteX1" fmla="*/ 598603 w 598611"/>
+              <a:gd name="connsiteY1" fmla="*/ 309818 h 822507"/>
+              <a:gd name="connsiteX2" fmla="*/ 0 w 598611"/>
+              <a:gd name="connsiteY2" fmla="*/ 822507 h 822507"/>
+              <a:gd name="connsiteX0" fmla="*/ 240384 w 598626"/>
+              <a:gd name="connsiteY0" fmla="*/ 0 h 822507"/>
+              <a:gd name="connsiteX1" fmla="*/ 598603 w 598626"/>
+              <a:gd name="connsiteY1" fmla="*/ 309818 h 822507"/>
+              <a:gd name="connsiteX2" fmla="*/ 0 w 598626"/>
+              <a:gd name="connsiteY2" fmla="*/ 822507 h 822507"/>
+              <a:gd name="connsiteX0" fmla="*/ 240384 w 598626"/>
+              <a:gd name="connsiteY0" fmla="*/ 0 h 822507"/>
+              <a:gd name="connsiteX1" fmla="*/ 598603 w 598626"/>
+              <a:gd name="connsiteY1" fmla="*/ 535755 h 822507"/>
+              <a:gd name="connsiteX2" fmla="*/ 0 w 598626"/>
+              <a:gd name="connsiteY2" fmla="*/ 822507 h 822507"/>
+              <a:gd name="connsiteX0" fmla="*/ 240384 w 598626"/>
+              <a:gd name="connsiteY0" fmla="*/ 0 h 822507"/>
+              <a:gd name="connsiteX1" fmla="*/ 598603 w 598626"/>
+              <a:gd name="connsiteY1" fmla="*/ 535755 h 822507"/>
+              <a:gd name="connsiteX2" fmla="*/ 0 w 598626"/>
+              <a:gd name="connsiteY2" fmla="*/ 822507 h 822507"/>
+              <a:gd name="connsiteX0" fmla="*/ 254524 w 618185"/>
+              <a:gd name="connsiteY0" fmla="*/ 0 h 1181952"/>
+              <a:gd name="connsiteX1" fmla="*/ 612743 w 618185"/>
+              <a:gd name="connsiteY1" fmla="*/ 535755 h 1181952"/>
+              <a:gd name="connsiteX2" fmla="*/ 0 w 618185"/>
+              <a:gd name="connsiteY2" fmla="*/ 1181952 h 1181952"/>
+              <a:gd name="connsiteX0" fmla="*/ 254524 w 618185"/>
+              <a:gd name="connsiteY0" fmla="*/ 0 h 1181952"/>
+              <a:gd name="connsiteX1" fmla="*/ 612743 w 618185"/>
+              <a:gd name="connsiteY1" fmla="*/ 746288 h 1181952"/>
+              <a:gd name="connsiteX2" fmla="*/ 0 w 618185"/>
+              <a:gd name="connsiteY2" fmla="*/ 1181952 h 1181952"/>
+              <a:gd name="connsiteX0" fmla="*/ 254524 w 618185"/>
+              <a:gd name="connsiteY0" fmla="*/ 0 h 1181952"/>
+              <a:gd name="connsiteX1" fmla="*/ 612743 w 618185"/>
+              <a:gd name="connsiteY1" fmla="*/ 746288 h 1181952"/>
+              <a:gd name="connsiteX2" fmla="*/ 0 w 618185"/>
+              <a:gd name="connsiteY2" fmla="*/ 1181952 h 1181952"/>
+              <a:gd name="connsiteX0" fmla="*/ 254524 w 614039"/>
+              <a:gd name="connsiteY0" fmla="*/ 0 h 1181952"/>
+              <a:gd name="connsiteX1" fmla="*/ 612743 w 614039"/>
+              <a:gd name="connsiteY1" fmla="*/ 746288 h 1181952"/>
+              <a:gd name="connsiteX2" fmla="*/ 0 w 614039"/>
+              <a:gd name="connsiteY2" fmla="*/ 1181952 h 1181952"/>
+              <a:gd name="connsiteX0" fmla="*/ 164157 w 614553"/>
+              <a:gd name="connsiteY0" fmla="*/ 0 h 1168822"/>
+              <a:gd name="connsiteX1" fmla="*/ 612743 w 614553"/>
+              <a:gd name="connsiteY1" fmla="*/ 733158 h 1168822"/>
+              <a:gd name="connsiteX2" fmla="*/ 0 w 614553"/>
+              <a:gd name="connsiteY2" fmla="*/ 1168822 h 1168822"/>
+              <a:gd name="connsiteX0" fmla="*/ 164157 w 614651"/>
+              <a:gd name="connsiteY0" fmla="*/ 0 h 1168822"/>
+              <a:gd name="connsiteX1" fmla="*/ 612743 w 614651"/>
+              <a:gd name="connsiteY1" fmla="*/ 733158 h 1168822"/>
+              <a:gd name="connsiteX2" fmla="*/ 0 w 614651"/>
+              <a:gd name="connsiteY2" fmla="*/ 1168822 h 1168822"/>
+              <a:gd name="connsiteX0" fmla="*/ 142250 w 614105"/>
+              <a:gd name="connsiteY0" fmla="*/ 0 h 1155839"/>
+              <a:gd name="connsiteX1" fmla="*/ 612743 w 614105"/>
+              <a:gd name="connsiteY1" fmla="*/ 720175 h 1155839"/>
+              <a:gd name="connsiteX2" fmla="*/ 0 w 614105"/>
+              <a:gd name="connsiteY2" fmla="*/ 1155839 h 1155839"/>
+              <a:gd name="connsiteX0" fmla="*/ 142250 w 615257"/>
+              <a:gd name="connsiteY0" fmla="*/ 0 h 1155839"/>
+              <a:gd name="connsiteX1" fmla="*/ 612743 w 615257"/>
+              <a:gd name="connsiteY1" fmla="*/ 720175 h 1155839"/>
+              <a:gd name="connsiteX2" fmla="*/ 0 w 615257"/>
+              <a:gd name="connsiteY2" fmla="*/ 1155839 h 1155839"/>
+              <a:gd name="connsiteX0" fmla="*/ 0 w 542839"/>
+              <a:gd name="connsiteY0" fmla="*/ 0 h 988686"/>
+              <a:gd name="connsiteX1" fmla="*/ 470493 w 542839"/>
+              <a:gd name="connsiteY1" fmla="*/ 720175 h 988686"/>
+              <a:gd name="connsiteX2" fmla="*/ 411738 w 542839"/>
+              <a:gd name="connsiteY2" fmla="*/ 988686 h 988686"/>
+              <a:gd name="connsiteX0" fmla="*/ 0 w 411738"/>
+              <a:gd name="connsiteY0" fmla="*/ 0 h 988686"/>
+              <a:gd name="connsiteX1" fmla="*/ 411738 w 411738"/>
+              <a:gd name="connsiteY1" fmla="*/ 988686 h 988686"/>
+              <a:gd name="connsiteX0" fmla="*/ 0 w 411738"/>
+              <a:gd name="connsiteY0" fmla="*/ 0 h 988686"/>
+              <a:gd name="connsiteX1" fmla="*/ 411738 w 411738"/>
+              <a:gd name="connsiteY1" fmla="*/ 988686 h 988686"/>
+              <a:gd name="connsiteX0" fmla="*/ 0 w 515992"/>
+              <a:gd name="connsiteY0" fmla="*/ 0 h 999133"/>
+              <a:gd name="connsiteX1" fmla="*/ 515992 w 515992"/>
+              <a:gd name="connsiteY1" fmla="*/ 999133 h 999133"/>
+              <a:gd name="connsiteX0" fmla="*/ 0 w 515992"/>
+              <a:gd name="connsiteY0" fmla="*/ 0 h 999133"/>
+              <a:gd name="connsiteX1" fmla="*/ 515992 w 515992"/>
+              <a:gd name="connsiteY1" fmla="*/ 999133 h 999133"/>
+            </a:gdLst>
+            <a:ahLst/>
+            <a:cxnLst>
+              <a:cxn ang="0">
+                <a:pos x="connsiteX0" y="connsiteY0"/>
+              </a:cxn>
+              <a:cxn ang="0">
+                <a:pos x="connsiteX1" y="connsiteY1"/>
+              </a:cxn>
+            </a:cxnLst>
+            <a:rect l="l" t="t" r="r" b="b"/>
+            <a:pathLst>
+              <a:path w="515992" h="999133">
+                <a:moveTo>
+                  <a:pt x="0" y="0"/>
+                </a:moveTo>
+                <a:cubicBezTo>
+                  <a:pt x="297509" y="23113"/>
+                  <a:pt x="503518" y="-23421"/>
+                  <a:pt x="515992" y="999133"/>
+                </a:cubicBezTo>
+              </a:path>
+            </a:pathLst>
+          </a:custGeom>
+          <a:noFill/>
+          <a:ln>
+            <a:solidFill>
+              <a:srgbClr val="C00000"/>
+            </a:solidFill>
+            <a:headEnd type="triangle" w="lg" len="lg"/>
+          </a:ln>
+        </p:spPr>
+        <p:style>
+          <a:lnRef idx="2">
+            <a:schemeClr val="accent1">
+              <a:shade val="50000"/>
+            </a:schemeClr>
+          </a:lnRef>
+          <a:fillRef idx="1">
+            <a:schemeClr val="accent1"/>
+          </a:fillRef>
+          <a:effectRef idx="0">
+            <a:schemeClr val="accent1"/>
+          </a:effectRef>
+          <a:fontRef idx="minor">
+            <a:schemeClr val="lt1"/>
+          </a:fontRef>
+        </p:style>
+        <p:txBody>
+          <a:bodyPr rtlCol="0" anchor="ctr"/>
+          <a:lstStyle/>
+          <a:p>
+            <a:pPr algn="ctr"/>
+            <a:endParaRPr lang="en-US"/>
           </a:p>
         </p:txBody>
       </p:sp>

</xml_diff>

<commit_message>
all-slides-with-answers.pdf all-slides.pdf lists.pdf lists.pptx
</commit_message>
<xml_diff>
--- a/ipsa/slides/lists.pptx
+++ b/ipsa/slides/lists.pptx
@@ -147,7 +147,7 @@
 <file path=ppt/revisionInfo.xml><?xml version="1.0" encoding="utf-8"?>
 <p1510:revInfo xmlns:a="http://schemas.openxmlformats.org/drawingml/2006/main" xmlns:r="http://schemas.openxmlformats.org/officeDocument/2006/relationships" xmlns:p1510="http://schemas.microsoft.com/office/powerpoint/2015/10/main">
   <p1510:revLst>
-    <p1510:client id="{5569C976-1ADA-4DA8-9761-4E88C2A5DB41}" v="12" dt="2026-02-03T18:48:17.011"/>
+    <p1510:client id="{5569C976-1ADA-4DA8-9761-4E88C2A5DB41}" v="15" dt="2026-02-09T06:11:52.293"/>
   </p1510:revLst>
 </p1510:revInfo>
 </file>
@@ -157,7 +157,7 @@
   <pc:docChgLst>
     <pc:chgData name="Gerth Stølting Brodal" userId="04ef4784-6591-4f86-a140-f5c3b108582a" providerId="ADAL" clId="{73BAC7D6-516A-44B5-B4B0-C7B08CA8B392}"/>
     <pc:docChg chg="undo custSel modSld">
-      <pc:chgData name="Gerth Stølting Brodal" userId="04ef4784-6591-4f86-a140-f5c3b108582a" providerId="ADAL" clId="{73BAC7D6-516A-44B5-B4B0-C7B08CA8B392}" dt="2026-02-03T19:03:02.829" v="602" actId="20577"/>
+      <pc:chgData name="Gerth Stølting Brodal" userId="04ef4784-6591-4f86-a140-f5c3b108582a" providerId="ADAL" clId="{73BAC7D6-516A-44B5-B4B0-C7B08CA8B392}" dt="2026-02-09T06:39:03.480" v="745" actId="1038"/>
       <pc:docMkLst>
         <pc:docMk/>
       </pc:docMkLst>
@@ -584,8 +584,8 @@
           </ac:graphicFrameMkLst>
         </pc:graphicFrameChg>
       </pc:sldChg>
-      <pc:sldChg chg="modSp mod">
-        <pc:chgData name="Gerth Stølting Brodal" userId="04ef4784-6591-4f86-a140-f5c3b108582a" providerId="ADAL" clId="{73BAC7D6-516A-44B5-B4B0-C7B08CA8B392}" dt="2026-02-03T18:55:01.667" v="530" actId="790"/>
+      <pc:sldChg chg="modSp mod modNotesTx">
+        <pc:chgData name="Gerth Stølting Brodal" userId="04ef4784-6591-4f86-a140-f5c3b108582a" providerId="ADAL" clId="{73BAC7D6-516A-44B5-B4B0-C7B08CA8B392}" dt="2026-02-09T05:28:51.656" v="627" actId="20577"/>
         <pc:sldMkLst>
           <pc:docMk/>
           <pc:sldMk cId="3289563800" sldId="495"/>
@@ -1206,7 +1206,7 @@
         </pc:graphicFrameChg>
       </pc:sldChg>
       <pc:sldChg chg="modSp mod modNotesTx">
-        <pc:chgData name="Gerth Stølting Brodal" userId="04ef4784-6591-4f86-a140-f5c3b108582a" providerId="ADAL" clId="{73BAC7D6-516A-44B5-B4B0-C7B08CA8B392}" dt="2026-02-03T18:55:01.667" v="530" actId="790"/>
+        <pc:chgData name="Gerth Stølting Brodal" userId="04ef4784-6591-4f86-a140-f5c3b108582a" providerId="ADAL" clId="{73BAC7D6-516A-44B5-B4B0-C7B08CA8B392}" dt="2026-02-09T05:58:19.048" v="642" actId="20577"/>
         <pc:sldMkLst>
           <pc:docMk/>
           <pc:sldMk cId="1553393585" sldId="509"/>
@@ -1228,8 +1228,8 @@
           </ac:spMkLst>
         </pc:spChg>
       </pc:sldChg>
-      <pc:sldChg chg="modSp mod">
-        <pc:chgData name="Gerth Stølting Brodal" userId="04ef4784-6591-4f86-a140-f5c3b108582a" providerId="ADAL" clId="{73BAC7D6-516A-44B5-B4B0-C7B08CA8B392}" dt="2026-02-03T18:55:01.667" v="530" actId="790"/>
+      <pc:sldChg chg="modSp mod modNotesTx">
+        <pc:chgData name="Gerth Stølting Brodal" userId="04ef4784-6591-4f86-a140-f5c3b108582a" providerId="ADAL" clId="{73BAC7D6-516A-44B5-B4B0-C7B08CA8B392}" dt="2026-02-09T06:12:15.290" v="699" actId="20577"/>
         <pc:sldMkLst>
           <pc:docMk/>
           <pc:sldMk cId="3648550906" sldId="510"/>
@@ -1353,7 +1353,7 @@
         </pc:graphicFrameChg>
       </pc:sldChg>
       <pc:sldChg chg="modSp mod">
-        <pc:chgData name="Gerth Stølting Brodal" userId="04ef4784-6591-4f86-a140-f5c3b108582a" providerId="ADAL" clId="{73BAC7D6-516A-44B5-B4B0-C7B08CA8B392}" dt="2026-02-03T18:55:01.667" v="530" actId="790"/>
+        <pc:chgData name="Gerth Stølting Brodal" userId="04ef4784-6591-4f86-a140-f5c3b108582a" providerId="ADAL" clId="{73BAC7D6-516A-44B5-B4B0-C7B08CA8B392}" dt="2026-02-09T06:39:03.480" v="745" actId="1038"/>
         <pc:sldMkLst>
           <pc:docMk/>
           <pc:sldMk cId="2400466622" sldId="514"/>
@@ -1391,7 +1391,7 @@
           </ac:spMkLst>
         </pc:spChg>
         <pc:spChg chg="mod">
-          <ac:chgData name="Gerth Stølting Brodal" userId="04ef4784-6591-4f86-a140-f5c3b108582a" providerId="ADAL" clId="{73BAC7D6-516A-44B5-B4B0-C7B08CA8B392}" dt="2026-02-03T18:55:01.667" v="530" actId="790"/>
+          <ac:chgData name="Gerth Stølting Brodal" userId="04ef4784-6591-4f86-a140-f5c3b108582a" providerId="ADAL" clId="{73BAC7D6-516A-44B5-B4B0-C7B08CA8B392}" dt="2026-02-09T06:39:03.480" v="745" actId="1038"/>
           <ac:spMkLst>
             <pc:docMk/>
             <pc:sldMk cId="2400466622" sldId="514"/>
@@ -1643,7 +1643,7 @@
           <a:p>
             <a:fld id="{FB1A172F-81D4-4DC4-9113-1DBD56EC3646}" type="datetimeFigureOut">
               <a:rPr lang="en-US" smtClean="0"/>
-              <a:t>2/3/2026</a:t>
+              <a:t>2/9/2026</a:t>
             </a:fld>
             <a:endParaRPr lang="en-US"/>
           </a:p>
@@ -2053,64 +2053,23 @@
           <a:bodyPr/>
           <a:lstStyle/>
           <a:p>
-            <a:pPr marL="0" marR="0" lvl="0" indent="0" algn="l" defTabSz="914400" rtl="0" eaLnBrk="1" fontAlgn="auto" latinLnBrk="0" hangingPunct="1">
-              <a:lnSpc>
-                <a:spcPct val="100000"/>
-              </a:lnSpc>
-              <a:spcBef>
-                <a:spcPts val="0"/>
-              </a:spcBef>
-              <a:spcAft>
-                <a:spcPts val="0"/>
-              </a:spcAft>
-              <a:buClrTx/>
-              <a:buSzTx/>
-              <a:buFontTx/>
-              <a:buNone/>
-              <a:tabLst/>
-              <a:defRPr/>
-            </a:pPr>
-            <a:r>
-              <a:rPr lang="en-US" b="1" dirty="0"/>
-              <a:t>Microsoft BASIC for 6502 [1978]</a:t>
-            </a:r>
-          </a:p>
-          <a:p>
-            <a:r>
-              <a:rPr lang="en-US" sz="1200" b="1" kern="1200" dirty="0">
-                <a:solidFill>
-                  <a:schemeClr val="tx1"/>
-                </a:solidFill>
-                <a:latin typeface="+mn-lt"/>
-                <a:ea typeface="+mn-ea"/>
-                <a:cs typeface="+mn-cs"/>
-              </a:rPr>
-              <a:t>Bill Gates</a:t>
-            </a:r>
-            <a:r>
-              <a:rPr lang="en-US" sz="1200" kern="1200" dirty="0">
-                <a:solidFill>
-                  <a:schemeClr val="tx1"/>
-                </a:solidFill>
-                <a:latin typeface="+mn-lt"/>
-                <a:ea typeface="+mn-ea"/>
-                <a:cs typeface="+mn-cs"/>
-              </a:rPr>
-              <a:t>, Paul Allen, Monte Davidoff</a:t>
+            <a:r>
+              <a:rPr lang="en-US" dirty="0"/>
+              <a:t>NOTE i in </a:t>
+            </a:r>
+            <a:r>
+              <a:rPr lang="en-US"/>
+              <a:t>2</a:t>
+            </a:r>
+            <a:r>
+              <a:rPr lang="en-US" baseline="30000"/>
+              <a:t>nd</a:t>
+            </a:r>
+            <a:r>
+              <a:rPr lang="en-US"/>
+              <a:t> for-loop</a:t>
             </a:r>
             <a:endParaRPr lang="en-US" dirty="0"/>
-          </a:p>
-          <a:p>
-            <a:r>
-              <a:rPr lang="en-US" dirty="0"/>
-              <a:t>https://www.pagetable.com/?p=774</a:t>
-            </a:r>
-          </a:p>
-          <a:p>
-            <a:r>
-              <a:rPr lang="en-US" dirty="0"/>
-              <a:t>(licensed by Commodore for the Commodore C64)</a:t>
-            </a:r>
           </a:p>
         </p:txBody>
       </p:sp>
@@ -2131,7 +2090,7 @@
           <a:p>
             <a:fld id="{CD563DD8-32AB-41BE-B1C6-8EAC45222ACE}" type="slidenum">
               <a:rPr lang="en-US" smtClean="0"/>
-              <a:t>20</a:t>
+              <a:t>18</a:t>
             </a:fld>
             <a:endParaRPr lang="en-US"/>
           </a:p>
@@ -2140,7 +2099,7 @@
     </p:spTree>
     <p:extLst>
       <p:ext uri="{BB962C8B-B14F-4D97-AF65-F5344CB8AC3E}">
-        <p14:creationId xmlns:p14="http://schemas.microsoft.com/office/powerpoint/2010/main" val="2911469987"/>
+        <p14:creationId xmlns:p14="http://schemas.microsoft.com/office/powerpoint/2010/main" val="3366940037"/>
       </p:ext>
     </p:extLst>
   </p:cSld>
@@ -2196,21 +2155,51 @@
           <a:p>
             <a:r>
               <a:rPr lang="en-US" dirty="0"/>
-              <a:t>example</a:t>
+              <a:t>Note BASIC</a:t>
             </a:r>
             <a:r>
               <a:rPr lang="en-US" baseline="0" dirty="0"/>
-              <a:t> of tested loops</a:t>
-            </a:r>
-          </a:p>
-          <a:p>
-            <a:r>
-              <a:rPr lang="en-US" baseline="0" dirty="0" err="1"/>
-              <a:t>Handin</a:t>
-            </a:r>
+              <a:t> includes the last index in the range for the for-loop</a:t>
+            </a:r>
+          </a:p>
+          <a:p>
             <a:r>
               <a:rPr lang="en-US" baseline="0" dirty="0"/>
-              <a:t>: make a more efficient algorithm</a:t>
+              <a:t>Needs keyword NEXT to indicate where the FOR loop ends</a:t>
+            </a:r>
+          </a:p>
+          <a:p>
+            <a:r>
+              <a:rPr lang="en-US" dirty="0"/>
+              <a:t>https://vice.pokefinder.org/ run x64.exe</a:t>
+            </a:r>
+          </a:p>
+          <a:p>
+            <a:r>
+              <a:rPr lang="en-US" dirty="0"/>
+              <a:t>Alt-D toggle full</a:t>
+            </a:r>
+            <a:r>
+              <a:rPr lang="en-US" baseline="0" dirty="0"/>
+              <a:t> screen</a:t>
+            </a:r>
+          </a:p>
+          <a:p>
+            <a:r>
+              <a:rPr lang="en-US" baseline="0" dirty="0"/>
+              <a:t>LIST : show program</a:t>
+            </a:r>
+          </a:p>
+          <a:p>
+            <a:r>
+              <a:rPr lang="en-US" baseline="0" dirty="0"/>
+              <a:t>RUN : run program</a:t>
+            </a:r>
+          </a:p>
+          <a:p>
+            <a:r>
+              <a:rPr lang="en-US" baseline="0" dirty="0"/>
+              <a:t>Alt-F12 : Hardware reset</a:t>
             </a:r>
             <a:endParaRPr lang="en-US" dirty="0"/>
           </a:p>
@@ -2233,7 +2222,7 @@
           <a:p>
             <a:fld id="{CD563DD8-32AB-41BE-B1C6-8EAC45222ACE}" type="slidenum">
               <a:rPr lang="en-US" smtClean="0"/>
-              <a:t>21</a:t>
+              <a:t>19</a:t>
             </a:fld>
             <a:endParaRPr lang="en-US"/>
           </a:p>
@@ -2242,7 +2231,7 @@
     </p:spTree>
     <p:extLst>
       <p:ext uri="{BB962C8B-B14F-4D97-AF65-F5344CB8AC3E}">
-        <p14:creationId xmlns:p14="http://schemas.microsoft.com/office/powerpoint/2010/main" val="1218980682"/>
+        <p14:creationId xmlns:p14="http://schemas.microsoft.com/office/powerpoint/2010/main" val="3621744206"/>
       </p:ext>
     </p:extLst>
   </p:cSld>
@@ -2296,84 +2285,64 @@
           <a:bodyPr/>
           <a:lstStyle/>
           <a:p>
+            <a:pPr marL="0" marR="0" lvl="0" indent="0" algn="l" defTabSz="914400" rtl="0" eaLnBrk="1" fontAlgn="auto" latinLnBrk="0" hangingPunct="1">
+              <a:lnSpc>
+                <a:spcPct val="100000"/>
+              </a:lnSpc>
+              <a:spcBef>
+                <a:spcPts val="0"/>
+              </a:spcBef>
+              <a:spcAft>
+                <a:spcPts val="0"/>
+              </a:spcAft>
+              <a:buClrTx/>
+              <a:buSzTx/>
+              <a:buFontTx/>
+              <a:buNone/>
+              <a:tabLst/>
+              <a:defRPr/>
+            </a:pPr>
+            <a:r>
+              <a:rPr lang="en-US" b="1" dirty="0"/>
+              <a:t>Microsoft BASIC for 6502 [1978]</a:t>
+            </a:r>
+          </a:p>
+          <a:p>
+            <a:r>
+              <a:rPr lang="en-US" sz="1200" b="1" kern="1200" dirty="0">
+                <a:solidFill>
+                  <a:schemeClr val="tx1"/>
+                </a:solidFill>
+                <a:latin typeface="+mn-lt"/>
+                <a:ea typeface="+mn-ea"/>
+                <a:cs typeface="+mn-cs"/>
+              </a:rPr>
+              <a:t>Bill Gates</a:t>
+            </a:r>
+            <a:r>
+              <a:rPr lang="en-US" sz="1200" kern="1200" dirty="0">
+                <a:solidFill>
+                  <a:schemeClr val="tx1"/>
+                </a:solidFill>
+                <a:latin typeface="+mn-lt"/>
+                <a:ea typeface="+mn-ea"/>
+                <a:cs typeface="+mn-cs"/>
+              </a:rPr>
+              <a:t>, Paul Allen, Monte Davidoff</a:t>
+            </a:r>
+            <a:endParaRPr lang="en-US" dirty="0"/>
+          </a:p>
+          <a:p>
             <a:r>
               <a:rPr lang="en-US" dirty="0"/>
-              <a:t>Possible optimizations:</a:t>
-            </a:r>
-            <a:endParaRPr lang="en-US" baseline="0" dirty="0"/>
-          </a:p>
-          <a:p>
-            <a:pPr marL="228600" indent="-228600">
-              <a:buAutoNum type="arabicParenR"/>
-            </a:pPr>
-            <a:r>
-              <a:rPr lang="en-US" baseline="0" dirty="0"/>
-              <a:t>Skip j if </a:t>
-            </a:r>
-            <a:r>
-              <a:rPr lang="en-US" b="1" baseline="0" dirty="0"/>
-              <a:t>prime[j] == False</a:t>
-            </a:r>
-          </a:p>
-          <a:p>
-            <a:pPr marL="228600" indent="-228600">
-              <a:buAutoNum type="arabicParenR"/>
-            </a:pPr>
-            <a:r>
-              <a:rPr lang="en-US" baseline="0" dirty="0"/>
-              <a:t>for i in range(2, </a:t>
-            </a:r>
-            <a:r>
-              <a:rPr lang="en-US" b="1" baseline="0" dirty="0" err="1"/>
-              <a:t>sqrt</a:t>
-            </a:r>
-            <a:r>
-              <a:rPr lang="en-US" b="1" baseline="0" dirty="0"/>
-              <a:t>(n)</a:t>
-            </a:r>
-            <a:r>
-              <a:rPr lang="en-US" baseline="0" dirty="0"/>
-              <a:t>)</a:t>
-            </a:r>
-          </a:p>
-          <a:p>
-            <a:pPr marL="228600" indent="-228600">
-              <a:buAutoNum type="arabicParenR"/>
-            </a:pPr>
+              <a:t>https://www.pagetable.com/?p=774</a:t>
+            </a:r>
+          </a:p>
+          <a:p>
             <a:r>
               <a:rPr lang="en-US" dirty="0"/>
-              <a:t>for</a:t>
-            </a:r>
-            <a:r>
-              <a:rPr lang="en-US" baseline="0" dirty="0"/>
-              <a:t> j in range(</a:t>
-            </a:r>
-            <a:r>
-              <a:rPr lang="en-US" b="1" baseline="0" dirty="0"/>
-              <a:t>i * i</a:t>
-            </a:r>
-            <a:r>
-              <a:rPr lang="en-US" baseline="0" dirty="0"/>
-              <a:t>, n + 1, </a:t>
-            </a:r>
-            <a:r>
-              <a:rPr lang="en-US" baseline="0" dirty="0" err="1"/>
-              <a:t>i</a:t>
-            </a:r>
-            <a:r>
-              <a:rPr lang="en-US" baseline="0" dirty="0"/>
-              <a:t>)</a:t>
-            </a:r>
-          </a:p>
-          <a:p>
-            <a:pPr marL="0" indent="0">
-              <a:buNone/>
-            </a:pPr>
-            <a:r>
-              <a:rPr lang="en-US" baseline="0" dirty="0"/>
-              <a:t>Run code</a:t>
-            </a:r>
-            <a:endParaRPr lang="en-US" dirty="0"/>
+              <a:t>(licensed by Commodore for the Commodore C64, released 1982)</a:t>
+            </a:r>
           </a:p>
         </p:txBody>
       </p:sp>
@@ -2394,7 +2363,7 @@
           <a:p>
             <a:fld id="{CD563DD8-32AB-41BE-B1C6-8EAC45222ACE}" type="slidenum">
               <a:rPr lang="en-US" smtClean="0"/>
-              <a:t>22</a:t>
+              <a:t>20</a:t>
             </a:fld>
             <a:endParaRPr lang="en-US"/>
           </a:p>
@@ -2403,7 +2372,7 @@
     </p:spTree>
     <p:extLst>
       <p:ext uri="{BB962C8B-B14F-4D97-AF65-F5344CB8AC3E}">
-        <p14:creationId xmlns:p14="http://schemas.microsoft.com/office/powerpoint/2010/main" val="817983497"/>
+        <p14:creationId xmlns:p14="http://schemas.microsoft.com/office/powerpoint/2010/main" val="2911469987"/>
       </p:ext>
     </p:extLst>
   </p:cSld>
@@ -2458,22 +2427,22 @@
           <a:lstStyle/>
           <a:p>
             <a:r>
-              <a:rPr lang="en-US" dirty="0" err="1"/>
-              <a:t>L.index</a:t>
-            </a:r>
-            <a:r>
               <a:rPr lang="en-US" dirty="0"/>
-              <a:t>(x) can only be called if x in L, otherwise an exception is raised</a:t>
-            </a:r>
-          </a:p>
-          <a:p>
-            <a:r>
-              <a:rPr lang="en-US" dirty="0"/>
-              <a:t>Last version also scans L two times (“in” and </a:t>
-            </a:r>
-            <a:r>
-              <a:rPr lang="en-US"/>
-              <a:t>“.index”)</a:t>
+              <a:t>example</a:t>
+            </a:r>
+            <a:r>
+              <a:rPr lang="en-US" baseline="0" dirty="0"/>
+              <a:t> of tested loops</a:t>
+            </a:r>
+          </a:p>
+          <a:p>
+            <a:r>
+              <a:rPr lang="en-US" baseline="0" dirty="0" err="1"/>
+              <a:t>Handin</a:t>
+            </a:r>
+            <a:r>
+              <a:rPr lang="en-US" baseline="0" dirty="0"/>
+              <a:t>: make a more efficient algorithm</a:t>
             </a:r>
             <a:endParaRPr lang="en-US" dirty="0"/>
           </a:p>
@@ -2496,7 +2465,7 @@
           <a:p>
             <a:fld id="{CD563DD8-32AB-41BE-B1C6-8EAC45222ACE}" type="slidenum">
               <a:rPr lang="en-US" smtClean="0"/>
-              <a:t>24</a:t>
+              <a:t>21</a:t>
             </a:fld>
             <a:endParaRPr lang="en-US"/>
           </a:p>
@@ -2505,7 +2474,7 @@
     </p:spTree>
     <p:extLst>
       <p:ext uri="{BB962C8B-B14F-4D97-AF65-F5344CB8AC3E}">
-        <p14:creationId xmlns:p14="http://schemas.microsoft.com/office/powerpoint/2010/main" val="160988225"/>
+        <p14:creationId xmlns:p14="http://schemas.microsoft.com/office/powerpoint/2010/main" val="1218980682"/>
       </p:ext>
     </p:extLst>
   </p:cSld>
@@ -2561,8 +2530,82 @@
           <a:p>
             <a:r>
               <a:rPr lang="en-US" dirty="0"/>
-              <a:t>Recall strings are immutable</a:t>
-            </a:r>
+              <a:t>Possible optimizations:</a:t>
+            </a:r>
+            <a:endParaRPr lang="en-US" baseline="0" dirty="0"/>
+          </a:p>
+          <a:p>
+            <a:pPr marL="228600" indent="-228600">
+              <a:buAutoNum type="arabicParenR"/>
+            </a:pPr>
+            <a:r>
+              <a:rPr lang="en-US" baseline="0" dirty="0"/>
+              <a:t>Skip j if </a:t>
+            </a:r>
+            <a:r>
+              <a:rPr lang="en-US" b="1" baseline="0" dirty="0"/>
+              <a:t>prime[j] == False</a:t>
+            </a:r>
+          </a:p>
+          <a:p>
+            <a:pPr marL="228600" indent="-228600">
+              <a:buAutoNum type="arabicParenR"/>
+            </a:pPr>
+            <a:r>
+              <a:rPr lang="en-US" baseline="0" dirty="0"/>
+              <a:t>for i in range(2, </a:t>
+            </a:r>
+            <a:r>
+              <a:rPr lang="en-US" b="1" baseline="0" dirty="0" err="1"/>
+              <a:t>sqrt</a:t>
+            </a:r>
+            <a:r>
+              <a:rPr lang="en-US" b="1" baseline="0" dirty="0"/>
+              <a:t>(n)</a:t>
+            </a:r>
+            <a:r>
+              <a:rPr lang="en-US" baseline="0" dirty="0"/>
+              <a:t>)</a:t>
+            </a:r>
+          </a:p>
+          <a:p>
+            <a:pPr marL="228600" indent="-228600">
+              <a:buAutoNum type="arabicParenR"/>
+            </a:pPr>
+            <a:r>
+              <a:rPr lang="en-US" dirty="0"/>
+              <a:t>for</a:t>
+            </a:r>
+            <a:r>
+              <a:rPr lang="en-US" baseline="0" dirty="0"/>
+              <a:t> j in range(</a:t>
+            </a:r>
+            <a:r>
+              <a:rPr lang="en-US" b="1" baseline="0" dirty="0"/>
+              <a:t>i * i</a:t>
+            </a:r>
+            <a:r>
+              <a:rPr lang="en-US" baseline="0" dirty="0"/>
+              <a:t>, n + 1, </a:t>
+            </a:r>
+            <a:r>
+              <a:rPr lang="en-US" baseline="0" dirty="0" err="1"/>
+              <a:t>i</a:t>
+            </a:r>
+            <a:r>
+              <a:rPr lang="en-US" baseline="0" dirty="0"/>
+              <a:t>)</a:t>
+            </a:r>
+          </a:p>
+          <a:p>
+            <a:pPr marL="0" indent="0">
+              <a:buNone/>
+            </a:pPr>
+            <a:r>
+              <a:rPr lang="en-US" baseline="0" dirty="0"/>
+              <a:t>Run code</a:t>
+            </a:r>
+            <a:endParaRPr lang="en-US" dirty="0"/>
           </a:p>
         </p:txBody>
       </p:sp>
@@ -2583,7 +2626,7 @@
           <a:p>
             <a:fld id="{CD563DD8-32AB-41BE-B1C6-8EAC45222ACE}" type="slidenum">
               <a:rPr lang="en-US" smtClean="0"/>
-              <a:t>26</a:t>
+              <a:t>22</a:t>
             </a:fld>
             <a:endParaRPr lang="en-US"/>
           </a:p>
@@ -2592,7 +2635,7 @@
     </p:spTree>
     <p:extLst>
       <p:ext uri="{BB962C8B-B14F-4D97-AF65-F5344CB8AC3E}">
-        <p14:creationId xmlns:p14="http://schemas.microsoft.com/office/powerpoint/2010/main" val="1129669421"/>
+        <p14:creationId xmlns:p14="http://schemas.microsoft.com/office/powerpoint/2010/main" val="817983497"/>
       </p:ext>
     </p:extLst>
   </p:cSld>
@@ -2647,46 +2690,24 @@
           <a:lstStyle/>
           <a:p>
             <a:r>
-              <a:rPr lang="da-DK" dirty="0" err="1"/>
-              <a:t>time.time</a:t>
-            </a:r>
-            <a:r>
-              <a:rPr lang="da-DK" dirty="0"/>
-              <a:t>() returns the </a:t>
-            </a:r>
-            <a:r>
-              <a:rPr lang="da-DK" dirty="0" err="1"/>
-              <a:t>number</a:t>
-            </a:r>
-            <a:r>
-              <a:rPr lang="da-DK" dirty="0"/>
-              <a:t> of </a:t>
-            </a:r>
-            <a:r>
-              <a:rPr lang="da-DK" dirty="0" err="1"/>
-              <a:t>seconds</a:t>
-            </a:r>
-            <a:r>
-              <a:rPr lang="da-DK" dirty="0"/>
-              <a:t> </a:t>
-            </a:r>
-            <a:r>
-              <a:rPr lang="da-DK" dirty="0" err="1"/>
-              <a:t>since</a:t>
-            </a:r>
-            <a:r>
-              <a:rPr lang="da-DK" dirty="0"/>
-              <a:t> J</a:t>
-            </a:r>
-            <a:r>
               <a:rPr lang="en-US" dirty="0" err="1"/>
-              <a:t>anuary</a:t>
+              <a:t>L.index</a:t>
             </a:r>
             <a:r>
               <a:rPr lang="en-US" dirty="0"/>
-              <a:t> 1, 1970, 00:00:00 (UTC)</a:t>
-            </a:r>
-            <a:endParaRPr lang="da-DK" dirty="0"/>
+              <a:t>(x) can only be called if x in L, otherwise an exception is raised</a:t>
+            </a:r>
+          </a:p>
+          <a:p>
+            <a:r>
+              <a:rPr lang="en-US" dirty="0"/>
+              <a:t>Last version also scans L two times (“in” and </a:t>
+            </a:r>
+            <a:r>
+              <a:rPr lang="en-US"/>
+              <a:t>“.index”)</a:t>
+            </a:r>
+            <a:endParaRPr lang="en-US" dirty="0"/>
           </a:p>
         </p:txBody>
       </p:sp>
@@ -2697,7 +2718,7 @@
             <a:spLocks noGrp="1"/>
           </p:cNvSpPr>
           <p:nvPr>
-            <p:ph type="sldNum" sz="quarter" idx="5"/>
+            <p:ph type="sldNum" sz="quarter" idx="10"/>
           </p:nvPr>
         </p:nvSpPr>
         <p:spPr/>
@@ -2707,7 +2728,7 @@
           <a:p>
             <a:fld id="{CD563DD8-32AB-41BE-B1C6-8EAC45222ACE}" type="slidenum">
               <a:rPr lang="en-US" smtClean="0"/>
-              <a:t>27</a:t>
+              <a:t>24</a:t>
             </a:fld>
             <a:endParaRPr lang="en-US"/>
           </a:p>
@@ -2716,7 +2737,7 @@
     </p:spTree>
     <p:extLst>
       <p:ext uri="{BB962C8B-B14F-4D97-AF65-F5344CB8AC3E}">
-        <p14:creationId xmlns:p14="http://schemas.microsoft.com/office/powerpoint/2010/main" val="2233545429"/>
+        <p14:creationId xmlns:p14="http://schemas.microsoft.com/office/powerpoint/2010/main" val="160988225"/>
       </p:ext>
     </p:extLst>
   </p:cSld>
@@ -2772,13 +2793,35 @@
           <a:p>
             <a:r>
               <a:rPr lang="en-US" dirty="0"/>
-              <a:t>In source code</a:t>
-            </a:r>
-            <a:r>
-              <a:rPr lang="en-US" baseline="0" dirty="0"/>
-              <a:t> search for “&gt;&gt; 3”</a:t>
-            </a:r>
+              <a:t>Recall strings are immutable</a:t>
+            </a:r>
+          </a:p>
+          <a:p>
             <a:endParaRPr lang="en-US" dirty="0"/>
+          </a:p>
+          <a:p>
+            <a:r>
+              <a:rPr lang="en-US" dirty="0"/>
+              <a:t>Below allocates 1000 GB… but most garbage collected</a:t>
+            </a:r>
+          </a:p>
+          <a:p>
+            <a:r>
+              <a:rPr lang="en-US" dirty="0"/>
+              <a:t>s = ''</a:t>
+            </a:r>
+          </a:p>
+          <a:p>
+            <a:r>
+              <a:rPr lang="en-US" dirty="0"/>
+              <a:t>for x in range(1_000_000):</a:t>
+            </a:r>
+          </a:p>
+          <a:p>
+            <a:r>
+              <a:rPr lang="en-US" dirty="0"/>
+              <a:t>    s += 'x'</a:t>
+            </a:r>
           </a:p>
         </p:txBody>
       </p:sp>
@@ -2799,6 +2842,222 @@
           <a:p>
             <a:fld id="{CD563DD8-32AB-41BE-B1C6-8EAC45222ACE}" type="slidenum">
               <a:rPr lang="en-US" smtClean="0"/>
+              <a:t>26</a:t>
+            </a:fld>
+            <a:endParaRPr lang="en-US"/>
+          </a:p>
+        </p:txBody>
+      </p:sp>
+    </p:spTree>
+    <p:extLst>
+      <p:ext uri="{BB962C8B-B14F-4D97-AF65-F5344CB8AC3E}">
+        <p14:creationId xmlns:p14="http://schemas.microsoft.com/office/powerpoint/2010/main" val="1129669421"/>
+      </p:ext>
+    </p:extLst>
+  </p:cSld>
+  <p:clrMapOvr>
+    <a:masterClrMapping/>
+  </p:clrMapOvr>
+</p:notes>
+</file>
+
+<file path=ppt/notesSlides/notesSlide17.xml><?xml version="1.0" encoding="utf-8"?>
+<p:notes xmlns:a="http://schemas.openxmlformats.org/drawingml/2006/main" xmlns:r="http://schemas.openxmlformats.org/officeDocument/2006/relationships" xmlns:p="http://schemas.openxmlformats.org/presentationml/2006/main">
+  <p:cSld>
+    <p:spTree>
+      <p:nvGrpSpPr>
+        <p:cNvPr id="1" name=""/>
+        <p:cNvGrpSpPr/>
+        <p:nvPr/>
+      </p:nvGrpSpPr>
+      <p:grpSpPr>
+        <a:xfrm>
+          <a:off x="0" y="0"/>
+          <a:ext cx="0" cy="0"/>
+          <a:chOff x="0" y="0"/>
+          <a:chExt cx="0" cy="0"/>
+        </a:xfrm>
+      </p:grpSpPr>
+      <p:sp>
+        <p:nvSpPr>
+          <p:cNvPr id="2" name="Slide Image Placeholder 1"/>
+          <p:cNvSpPr>
+            <a:spLocks noGrp="1" noRot="1" noChangeAspect="1"/>
+          </p:cNvSpPr>
+          <p:nvPr>
+            <p:ph type="sldImg"/>
+          </p:nvPr>
+        </p:nvSpPr>
+        <p:spPr/>
+      </p:sp>
+      <p:sp>
+        <p:nvSpPr>
+          <p:cNvPr id="3" name="Notes Placeholder 2"/>
+          <p:cNvSpPr>
+            <a:spLocks noGrp="1"/>
+          </p:cNvSpPr>
+          <p:nvPr>
+            <p:ph type="body" idx="1"/>
+          </p:nvPr>
+        </p:nvSpPr>
+        <p:spPr/>
+        <p:txBody>
+          <a:bodyPr/>
+          <a:lstStyle/>
+          <a:p>
+            <a:r>
+              <a:rPr lang="da-DK" dirty="0" err="1"/>
+              <a:t>time.time</a:t>
+            </a:r>
+            <a:r>
+              <a:rPr lang="da-DK" dirty="0"/>
+              <a:t>() returns the </a:t>
+            </a:r>
+            <a:r>
+              <a:rPr lang="da-DK" dirty="0" err="1"/>
+              <a:t>number</a:t>
+            </a:r>
+            <a:r>
+              <a:rPr lang="da-DK" dirty="0"/>
+              <a:t> of </a:t>
+            </a:r>
+            <a:r>
+              <a:rPr lang="da-DK" dirty="0" err="1"/>
+              <a:t>seconds</a:t>
+            </a:r>
+            <a:r>
+              <a:rPr lang="da-DK" dirty="0"/>
+              <a:t> </a:t>
+            </a:r>
+            <a:r>
+              <a:rPr lang="da-DK" dirty="0" err="1"/>
+              <a:t>since</a:t>
+            </a:r>
+            <a:r>
+              <a:rPr lang="da-DK" dirty="0"/>
+              <a:t> J</a:t>
+            </a:r>
+            <a:r>
+              <a:rPr lang="en-US" dirty="0" err="1"/>
+              <a:t>anuary</a:t>
+            </a:r>
+            <a:r>
+              <a:rPr lang="en-US" dirty="0"/>
+              <a:t> 1, 1970, 00:00:00 (UTC)</a:t>
+            </a:r>
+            <a:endParaRPr lang="da-DK" dirty="0"/>
+          </a:p>
+        </p:txBody>
+      </p:sp>
+      <p:sp>
+        <p:nvSpPr>
+          <p:cNvPr id="4" name="Slide Number Placeholder 3"/>
+          <p:cNvSpPr>
+            <a:spLocks noGrp="1"/>
+          </p:cNvSpPr>
+          <p:nvPr>
+            <p:ph type="sldNum" sz="quarter" idx="5"/>
+          </p:nvPr>
+        </p:nvSpPr>
+        <p:spPr/>
+        <p:txBody>
+          <a:bodyPr/>
+          <a:lstStyle/>
+          <a:p>
+            <a:fld id="{CD563DD8-32AB-41BE-B1C6-8EAC45222ACE}" type="slidenum">
+              <a:rPr lang="en-US" smtClean="0"/>
+              <a:t>27</a:t>
+            </a:fld>
+            <a:endParaRPr lang="en-US"/>
+          </a:p>
+        </p:txBody>
+      </p:sp>
+    </p:spTree>
+    <p:extLst>
+      <p:ext uri="{BB962C8B-B14F-4D97-AF65-F5344CB8AC3E}">
+        <p14:creationId xmlns:p14="http://schemas.microsoft.com/office/powerpoint/2010/main" val="2233545429"/>
+      </p:ext>
+    </p:extLst>
+  </p:cSld>
+  <p:clrMapOvr>
+    <a:masterClrMapping/>
+  </p:clrMapOvr>
+</p:notes>
+</file>
+
+<file path=ppt/notesSlides/notesSlide18.xml><?xml version="1.0" encoding="utf-8"?>
+<p:notes xmlns:a="http://schemas.openxmlformats.org/drawingml/2006/main" xmlns:r="http://schemas.openxmlformats.org/officeDocument/2006/relationships" xmlns:p="http://schemas.openxmlformats.org/presentationml/2006/main">
+  <p:cSld>
+    <p:spTree>
+      <p:nvGrpSpPr>
+        <p:cNvPr id="1" name=""/>
+        <p:cNvGrpSpPr/>
+        <p:nvPr/>
+      </p:nvGrpSpPr>
+      <p:grpSpPr>
+        <a:xfrm>
+          <a:off x="0" y="0"/>
+          <a:ext cx="0" cy="0"/>
+          <a:chOff x="0" y="0"/>
+          <a:chExt cx="0" cy="0"/>
+        </a:xfrm>
+      </p:grpSpPr>
+      <p:sp>
+        <p:nvSpPr>
+          <p:cNvPr id="2" name="Slide Image Placeholder 1"/>
+          <p:cNvSpPr>
+            <a:spLocks noGrp="1" noRot="1" noChangeAspect="1"/>
+          </p:cNvSpPr>
+          <p:nvPr>
+            <p:ph type="sldImg"/>
+          </p:nvPr>
+        </p:nvSpPr>
+        <p:spPr/>
+      </p:sp>
+      <p:sp>
+        <p:nvSpPr>
+          <p:cNvPr id="3" name="Notes Placeholder 2"/>
+          <p:cNvSpPr>
+            <a:spLocks noGrp="1"/>
+          </p:cNvSpPr>
+          <p:nvPr>
+            <p:ph type="body" idx="1"/>
+          </p:nvPr>
+        </p:nvSpPr>
+        <p:spPr/>
+        <p:txBody>
+          <a:bodyPr/>
+          <a:lstStyle/>
+          <a:p>
+            <a:r>
+              <a:rPr lang="en-US" dirty="0"/>
+              <a:t>In source code</a:t>
+            </a:r>
+            <a:r>
+              <a:rPr lang="en-US" baseline="0" dirty="0"/>
+              <a:t> search for “&gt;&gt; 3”</a:t>
+            </a:r>
+            <a:endParaRPr lang="en-US" dirty="0"/>
+          </a:p>
+        </p:txBody>
+      </p:sp>
+      <p:sp>
+        <p:nvSpPr>
+          <p:cNvPr id="4" name="Slide Number Placeholder 3"/>
+          <p:cNvSpPr>
+            <a:spLocks noGrp="1"/>
+          </p:cNvSpPr>
+          <p:nvPr>
+            <p:ph type="sldNum" sz="quarter" idx="10"/>
+          </p:nvPr>
+        </p:nvSpPr>
+        <p:spPr/>
+        <p:txBody>
+          <a:bodyPr/>
+          <a:lstStyle/>
+          <a:p>
+            <a:fld id="{CD563DD8-32AB-41BE-B1C6-8EAC45222ACE}" type="slidenum">
+              <a:rPr lang="en-US" smtClean="0"/>
               <a:t>28</a:t>
             </a:fld>
             <a:endParaRPr lang="en-US"/>
@@ -2818,7 +3077,7 @@
 </p:notes>
 </file>
 
-<file path=ppt/notesSlides/notesSlide17.xml><?xml version="1.0" encoding="utf-8"?>
+<file path=ppt/notesSlides/notesSlide19.xml><?xml version="1.0" encoding="utf-8"?>
 <p:notes xmlns:a="http://schemas.openxmlformats.org/drawingml/2006/main" xmlns:r="http://schemas.openxmlformats.org/officeDocument/2006/relationships" xmlns:p="http://schemas.openxmlformats.org/presentationml/2006/main">
   <p:cSld>
     <p:spTree>
@@ -3400,23 +3659,46 @@
           <a:p>
             <a:r>
               <a:rPr lang="en-US" dirty="0"/>
-              <a:t>NOTE </a:t>
-            </a:r>
-            <a:r>
-              <a:rPr lang="en-US" b="1" dirty="0"/>
-              <a:t>i</a:t>
-            </a:r>
+              <a:t>In pythonturor.com</a:t>
+            </a:r>
+          </a:p>
+          <a:p>
+            <a:endParaRPr lang="en-US" dirty="0"/>
+          </a:p>
+          <a:p>
             <a:r>
               <a:rPr lang="en-US" dirty="0"/>
-              <a:t> in 2</a:t>
-            </a:r>
-            <a:r>
-              <a:rPr lang="en-US" baseline="30000" dirty="0"/>
-              <a:t>nd</a:t>
-            </a:r>
+              <a:t>a = [1]</a:t>
+            </a:r>
+          </a:p>
+          <a:p>
             <a:r>
               <a:rPr lang="en-US" dirty="0"/>
-              <a:t> for-loop</a:t>
+              <a:t>b = a * 3</a:t>
+            </a:r>
+          </a:p>
+          <a:p>
+            <a:r>
+              <a:rPr lang="en-US" dirty="0"/>
+              <a:t>c = [b]</a:t>
+            </a:r>
+          </a:p>
+          <a:p>
+            <a:r>
+              <a:rPr lang="en-US" dirty="0"/>
+              <a:t>d = c * 3</a:t>
+            </a:r>
+          </a:p>
+          <a:p>
+            <a:r>
+              <a:rPr lang="en-US" dirty="0"/>
+              <a:t>d[0][0] = 42</a:t>
+            </a:r>
+          </a:p>
+          <a:p>
+            <a:r>
+              <a:rPr lang="en-US" dirty="0"/>
+              <a:t>print(d)</a:t>
             </a:r>
           </a:p>
         </p:txBody>
@@ -3428,7 +3710,7 @@
             <a:spLocks noGrp="1"/>
           </p:cNvSpPr>
           <p:nvPr>
-            <p:ph type="sldNum" sz="quarter" idx="10"/>
+            <p:ph type="sldNum" sz="quarter" idx="5"/>
           </p:nvPr>
         </p:nvSpPr>
         <p:spPr/>
@@ -3438,7 +3720,7 @@
           <a:p>
             <a:fld id="{CD563DD8-32AB-41BE-B1C6-8EAC45222ACE}" type="slidenum">
               <a:rPr lang="en-US" smtClean="0"/>
-              <a:t>17</a:t>
+              <a:t>13</a:t>
             </a:fld>
             <a:endParaRPr lang="en-US"/>
           </a:p>
@@ -3447,7 +3729,7 @@
     </p:spTree>
     <p:extLst>
       <p:ext uri="{BB962C8B-B14F-4D97-AF65-F5344CB8AC3E}">
-        <p14:creationId xmlns:p14="http://schemas.microsoft.com/office/powerpoint/2010/main" val="4184457804"/>
+        <p14:creationId xmlns:p14="http://schemas.microsoft.com/office/powerpoint/2010/main" val="1481669888"/>
       </p:ext>
     </p:extLst>
   </p:cSld>
@@ -3503,20 +3785,40 @@
           <a:p>
             <a:r>
               <a:rPr lang="en-US" dirty="0"/>
-              <a:t>NOTE i in </a:t>
-            </a:r>
-            <a:r>
-              <a:rPr lang="en-US"/>
-              <a:t>2</a:t>
-            </a:r>
-            <a:r>
-              <a:rPr lang="en-US" baseline="30000"/>
-              <a:t>nd</a:t>
-            </a:r>
-            <a:r>
-              <a:rPr lang="en-US"/>
-              <a:t> for-loop</a:t>
-            </a:r>
+              <a:t>for x in range(20):</a:t>
+            </a:r>
+          </a:p>
+          <a:p>
+            <a:r>
+              <a:rPr lang="en-US" dirty="0"/>
+              <a:t>    if x % 3 == 0:</a:t>
+            </a:r>
+          </a:p>
+          <a:p>
+            <a:r>
+              <a:rPr lang="en-US" dirty="0"/>
+              <a:t>        continue</a:t>
+            </a:r>
+          </a:p>
+          <a:p>
+            <a:r>
+              <a:rPr lang="en-US" dirty="0"/>
+              <a:t>    print(x)</a:t>
+            </a:r>
+          </a:p>
+          <a:p>
+            <a:r>
+              <a:rPr lang="en-US" dirty="0"/>
+              <a:t>    if x &gt; 12:</a:t>
+            </a:r>
+          </a:p>
+          <a:p>
+            <a:r>
+              <a:rPr lang="en-US" dirty="0"/>
+              <a:t>        break</a:t>
+            </a:r>
+          </a:p>
+          <a:p>
             <a:endParaRPr lang="en-US" dirty="0"/>
           </a:p>
         </p:txBody>
@@ -3528,7 +3830,7 @@
             <a:spLocks noGrp="1"/>
           </p:cNvSpPr>
           <p:nvPr>
-            <p:ph type="sldNum" sz="quarter" idx="10"/>
+            <p:ph type="sldNum" sz="quarter" idx="5"/>
           </p:nvPr>
         </p:nvSpPr>
         <p:spPr/>
@@ -3538,7 +3840,7 @@
           <a:p>
             <a:fld id="{CD563DD8-32AB-41BE-B1C6-8EAC45222ACE}" type="slidenum">
               <a:rPr lang="en-US" smtClean="0"/>
-              <a:t>18</a:t>
+              <a:t>16</a:t>
             </a:fld>
             <a:endParaRPr lang="en-US"/>
           </a:p>
@@ -3547,7 +3849,7 @@
     </p:spTree>
     <p:extLst>
       <p:ext uri="{BB962C8B-B14F-4D97-AF65-F5344CB8AC3E}">
-        <p14:creationId xmlns:p14="http://schemas.microsoft.com/office/powerpoint/2010/main" val="3366940037"/>
+        <p14:creationId xmlns:p14="http://schemas.microsoft.com/office/powerpoint/2010/main" val="1937481628"/>
       </p:ext>
     </p:extLst>
   </p:cSld>
@@ -3603,53 +3905,24 @@
           <a:p>
             <a:r>
               <a:rPr lang="en-US" dirty="0"/>
-              <a:t>Note BASIC</a:t>
-            </a:r>
-            <a:r>
-              <a:rPr lang="en-US" baseline="0" dirty="0"/>
-              <a:t> includes the last index in the range for the for-loop</a:t>
-            </a:r>
-          </a:p>
-          <a:p>
-            <a:r>
-              <a:rPr lang="en-US" baseline="0" dirty="0"/>
-              <a:t>Needs keyword NEXT to indicate where the FOR loop ends</a:t>
-            </a:r>
-          </a:p>
-          <a:p>
+              <a:t>NOTE </a:t>
+            </a:r>
+            <a:r>
+              <a:rPr lang="en-US" b="1" dirty="0"/>
+              <a:t>i</a:t>
+            </a:r>
             <a:r>
               <a:rPr lang="en-US" dirty="0"/>
-              <a:t>https://vice.pokefinder.org/ run x64.exe</a:t>
-            </a:r>
-          </a:p>
-          <a:p>
+              <a:t> in 2</a:t>
+            </a:r>
+            <a:r>
+              <a:rPr lang="en-US" baseline="30000" dirty="0"/>
+              <a:t>nd</a:t>
+            </a:r>
             <a:r>
               <a:rPr lang="en-US" dirty="0"/>
-              <a:t>Alt-D toggle full</a:t>
-            </a:r>
-            <a:r>
-              <a:rPr lang="en-US" baseline="0" dirty="0"/>
-              <a:t> screen</a:t>
-            </a:r>
-          </a:p>
-          <a:p>
-            <a:r>
-              <a:rPr lang="en-US" baseline="0" dirty="0"/>
-              <a:t>LIST : show program</a:t>
-            </a:r>
-          </a:p>
-          <a:p>
-            <a:r>
-              <a:rPr lang="en-US" baseline="0" dirty="0"/>
-              <a:t>RUN : run program</a:t>
-            </a:r>
-          </a:p>
-          <a:p>
-            <a:r>
-              <a:rPr lang="en-US" baseline="0" dirty="0"/>
-              <a:t>Alt-F12 : Hardware reset</a:t>
-            </a:r>
-            <a:endParaRPr lang="en-US" dirty="0"/>
+              <a:t> for-loop</a:t>
+            </a:r>
           </a:p>
         </p:txBody>
       </p:sp>
@@ -3670,7 +3943,7 @@
           <a:p>
             <a:fld id="{CD563DD8-32AB-41BE-B1C6-8EAC45222ACE}" type="slidenum">
               <a:rPr lang="en-US" smtClean="0"/>
-              <a:t>19</a:t>
+              <a:t>17</a:t>
             </a:fld>
             <a:endParaRPr lang="en-US"/>
           </a:p>
@@ -3679,7 +3952,7 @@
     </p:spTree>
     <p:extLst>
       <p:ext uri="{BB962C8B-B14F-4D97-AF65-F5344CB8AC3E}">
-        <p14:creationId xmlns:p14="http://schemas.microsoft.com/office/powerpoint/2010/main" val="3621744206"/>
+        <p14:creationId xmlns:p14="http://schemas.microsoft.com/office/powerpoint/2010/main" val="4184457804"/>
       </p:ext>
     </p:extLst>
   </p:cSld>
@@ -3826,7 +4099,7 @@
           <a:p>
             <a:fld id="{0560A9CD-0304-4E0B-9E82-E7E0115DE05B}" type="datetimeFigureOut">
               <a:rPr lang="en-US" smtClean="0"/>
-              <a:t>2/3/2026</a:t>
+              <a:t>2/9/2026</a:t>
             </a:fld>
             <a:endParaRPr lang="en-US"/>
           </a:p>
@@ -3994,7 +4267,7 @@
           <a:p>
             <a:fld id="{0560A9CD-0304-4E0B-9E82-E7E0115DE05B}" type="datetimeFigureOut">
               <a:rPr lang="en-US" smtClean="0"/>
-              <a:t>2/3/2026</a:t>
+              <a:t>2/9/2026</a:t>
             </a:fld>
             <a:endParaRPr lang="en-US"/>
           </a:p>
@@ -4172,7 +4445,7 @@
           <a:p>
             <a:fld id="{0560A9CD-0304-4E0B-9E82-E7E0115DE05B}" type="datetimeFigureOut">
               <a:rPr lang="en-US" smtClean="0"/>
-              <a:t>2/3/2026</a:t>
+              <a:t>2/9/2026</a:t>
             </a:fld>
             <a:endParaRPr lang="en-US"/>
           </a:p>
@@ -4349,7 +4622,7 @@
           <a:p>
             <a:fld id="{0560A9CD-0304-4E0B-9E82-E7E0115DE05B}" type="datetimeFigureOut">
               <a:rPr lang="en-US" smtClean="0"/>
-              <a:t>2/3/2026</a:t>
+              <a:t>2/9/2026</a:t>
             </a:fld>
             <a:endParaRPr lang="en-US"/>
           </a:p>
@@ -4594,7 +4867,7 @@
           <a:p>
             <a:fld id="{0560A9CD-0304-4E0B-9E82-E7E0115DE05B}" type="datetimeFigureOut">
               <a:rPr lang="en-US" smtClean="0"/>
-              <a:t>2/3/2026</a:t>
+              <a:t>2/9/2026</a:t>
             </a:fld>
             <a:endParaRPr lang="en-US"/>
           </a:p>
@@ -4823,7 +5096,7 @@
           <a:p>
             <a:fld id="{0560A9CD-0304-4E0B-9E82-E7E0115DE05B}" type="datetimeFigureOut">
               <a:rPr lang="en-US" smtClean="0"/>
-              <a:t>2/3/2026</a:t>
+              <a:t>2/9/2026</a:t>
             </a:fld>
             <a:endParaRPr lang="en-US"/>
           </a:p>
@@ -5187,7 +5460,7 @@
           <a:p>
             <a:fld id="{0560A9CD-0304-4E0B-9E82-E7E0115DE05B}" type="datetimeFigureOut">
               <a:rPr lang="en-US" smtClean="0"/>
-              <a:t>2/3/2026</a:t>
+              <a:t>2/9/2026</a:t>
             </a:fld>
             <a:endParaRPr lang="en-US"/>
           </a:p>
@@ -5304,7 +5577,7 @@
           <a:p>
             <a:fld id="{0560A9CD-0304-4E0B-9E82-E7E0115DE05B}" type="datetimeFigureOut">
               <a:rPr lang="en-US" smtClean="0"/>
-              <a:t>2/3/2026</a:t>
+              <a:t>2/9/2026</a:t>
             </a:fld>
             <a:endParaRPr lang="en-US"/>
           </a:p>
@@ -5399,7 +5672,7 @@
           <a:p>
             <a:fld id="{0560A9CD-0304-4E0B-9E82-E7E0115DE05B}" type="datetimeFigureOut">
               <a:rPr lang="en-US" smtClean="0"/>
-              <a:t>2/3/2026</a:t>
+              <a:t>2/9/2026</a:t>
             </a:fld>
             <a:endParaRPr lang="en-US"/>
           </a:p>
@@ -5674,7 +5947,7 @@
           <a:p>
             <a:fld id="{0560A9CD-0304-4E0B-9E82-E7E0115DE05B}" type="datetimeFigureOut">
               <a:rPr lang="en-US" smtClean="0"/>
-              <a:t>2/3/2026</a:t>
+              <a:t>2/9/2026</a:t>
             </a:fld>
             <a:endParaRPr lang="en-US"/>
           </a:p>
@@ -5926,7 +6199,7 @@
           <a:p>
             <a:fld id="{0560A9CD-0304-4E0B-9E82-E7E0115DE05B}" type="datetimeFigureOut">
               <a:rPr lang="en-US" smtClean="0"/>
-              <a:t>2/3/2026</a:t>
+              <a:t>2/9/2026</a:t>
             </a:fld>
             <a:endParaRPr lang="en-US"/>
           </a:p>
@@ -6137,7 +6410,7 @@
           <a:p>
             <a:fld id="{0560A9CD-0304-4E0B-9E82-E7E0115DE05B}" type="datetimeFigureOut">
               <a:rPr lang="en-US" smtClean="0"/>
-              <a:t>2/3/2026</a:t>
+              <a:t>2/9/2026</a:t>
             </a:fld>
             <a:endParaRPr lang="en-US"/>
           </a:p>
@@ -16588,7 +16861,7 @@
           <p:nvPr/>
         </p:nvPicPr>
         <p:blipFill>
-          <a:blip r:embed="rId2" cstate="print">
+          <a:blip r:embed="rId3" cstate="print">
             <a:extLst>
               <a:ext uri="{28A0092B-C50C-407E-A947-70E740481C1C}">
                 <a14:useLocalDpi xmlns:a14="http://schemas.microsoft.com/office/drawing/2010/main" val="0"/>
@@ -29189,8 +29462,8 @@
         </p:nvSpPr>
         <p:spPr>
           <a:xfrm>
-            <a:off x="1686048" y="5701138"/>
-            <a:ext cx="3359915" cy="646331"/>
+            <a:off x="1355768" y="5701138"/>
+            <a:ext cx="4563034" cy="646331"/>
           </a:xfrm>
           <a:prstGeom prst="rect">
             <a:avLst/>
@@ -29204,6 +29477,40 @@
           <a:lstStyle/>
           <a:p>
             <a:pPr algn="ctr"/>
+            <a:r>
+              <a:rPr lang="en-US" noProof="0" dirty="0" err="1">
+                <a:solidFill>
+                  <a:srgbClr val="C00000"/>
+                </a:solidFill>
+                <a:latin typeface="Courier"/>
+              </a:rPr>
+              <a:t>L.insert</a:t>
+            </a:r>
+            <a:r>
+              <a:rPr lang="en-US" noProof="0" dirty="0">
+                <a:solidFill>
+                  <a:srgbClr val="C00000"/>
+                </a:solidFill>
+                <a:latin typeface="Courier"/>
+              </a:rPr>
+              <a:t>(I, 42)</a:t>
+            </a:r>
+            <a:r>
+              <a:rPr lang="en-US" noProof="0" dirty="0">
+                <a:solidFill>
+                  <a:srgbClr val="C00000"/>
+                </a:solidFill>
+              </a:rPr>
+              <a:t> </a:t>
+            </a:r>
+            <a:r>
+              <a:rPr lang="en-US" dirty="0">
+                <a:solidFill>
+                  <a:srgbClr val="C00000"/>
+                </a:solidFill>
+              </a:rPr>
+              <a:t>or </a:t>
+            </a:r>
             <a:r>
               <a:rPr lang="en-US" noProof="0" dirty="0">
                 <a:solidFill>

</xml_diff>